<commit_message>
Update function graph implementations and add new pipeline versions
- Added demlevel_fg1.py with improved dam/reservoir data processing
- Created rainfall_fg_test.py and rainfall_fg_test1.py with enhanced rainfall data handling
- Updated waterlevel_fg.py filename format and added waterlevel_fg1.py with comprehensive water level pipeline
- Modified waterquality_fg.py filename format and added waterquality_fg1.py with automated pipeline
- Updated Architecture 1.pptx documentation
- Added deployment zip files for all new function graph implementations
</commit_message>
<xml_diff>
--- a/NAHRIM/Architecture 1.pptx
+++ b/NAHRIM/Architecture 1.pptx
@@ -5,14 +5,14 @@
     <p:sldMasterId id="2147483648" r:id="rId1"/>
   </p:sldMasterIdLst>
   <p:sldIdLst>
-    <p:sldId id="265" r:id="rId2"/>
-    <p:sldId id="256" r:id="rId3"/>
-    <p:sldId id="257" r:id="rId4"/>
-    <p:sldId id="258" r:id="rId5"/>
-    <p:sldId id="259" r:id="rId6"/>
-    <p:sldId id="260" r:id="rId7"/>
-    <p:sldId id="261" r:id="rId8"/>
-    <p:sldId id="262" r:id="rId9"/>
+    <p:sldId id="266" r:id="rId2"/>
+    <p:sldId id="262" r:id="rId3"/>
+    <p:sldId id="256" r:id="rId4"/>
+    <p:sldId id="257" r:id="rId5"/>
+    <p:sldId id="258" r:id="rId6"/>
+    <p:sldId id="259" r:id="rId7"/>
+    <p:sldId id="260" r:id="rId8"/>
+    <p:sldId id="261" r:id="rId9"/>
   </p:sldIdLst>
   <p:sldSz cx="12192000" cy="6858000"/>
   <p:notesSz cx="6858000" cy="9144000"/>
@@ -268,7 +268,7 @@
           <a:p>
             <a:fld id="{7328651E-CDC9-4A3C-9569-A439AFE4551F}" type="datetimeFigureOut">
               <a:rPr lang="en-MY" smtClean="0"/>
-              <a:t>2/12/2025</a:t>
+              <a:t>10/12/2025</a:t>
             </a:fld>
             <a:endParaRPr lang="en-MY"/>
           </a:p>
@@ -468,7 +468,7 @@
           <a:p>
             <a:fld id="{7328651E-CDC9-4A3C-9569-A439AFE4551F}" type="datetimeFigureOut">
               <a:rPr lang="en-MY" smtClean="0"/>
-              <a:t>2/12/2025</a:t>
+              <a:t>10/12/2025</a:t>
             </a:fld>
             <a:endParaRPr lang="en-MY"/>
           </a:p>
@@ -678,7 +678,7 @@
           <a:p>
             <a:fld id="{7328651E-CDC9-4A3C-9569-A439AFE4551F}" type="datetimeFigureOut">
               <a:rPr lang="en-MY" smtClean="0"/>
-              <a:t>2/12/2025</a:t>
+              <a:t>10/12/2025</a:t>
             </a:fld>
             <a:endParaRPr lang="en-MY"/>
           </a:p>
@@ -878,7 +878,7 @@
           <a:p>
             <a:fld id="{7328651E-CDC9-4A3C-9569-A439AFE4551F}" type="datetimeFigureOut">
               <a:rPr lang="en-MY" smtClean="0"/>
-              <a:t>2/12/2025</a:t>
+              <a:t>10/12/2025</a:t>
             </a:fld>
             <a:endParaRPr lang="en-MY"/>
           </a:p>
@@ -1154,7 +1154,7 @@
           <a:p>
             <a:fld id="{7328651E-CDC9-4A3C-9569-A439AFE4551F}" type="datetimeFigureOut">
               <a:rPr lang="en-MY" smtClean="0"/>
-              <a:t>2/12/2025</a:t>
+              <a:t>10/12/2025</a:t>
             </a:fld>
             <a:endParaRPr lang="en-MY"/>
           </a:p>
@@ -1422,7 +1422,7 @@
           <a:p>
             <a:fld id="{7328651E-CDC9-4A3C-9569-A439AFE4551F}" type="datetimeFigureOut">
               <a:rPr lang="en-MY" smtClean="0"/>
-              <a:t>2/12/2025</a:t>
+              <a:t>10/12/2025</a:t>
             </a:fld>
             <a:endParaRPr lang="en-MY"/>
           </a:p>
@@ -1837,7 +1837,7 @@
           <a:p>
             <a:fld id="{7328651E-CDC9-4A3C-9569-A439AFE4551F}" type="datetimeFigureOut">
               <a:rPr lang="en-MY" smtClean="0"/>
-              <a:t>2/12/2025</a:t>
+              <a:t>10/12/2025</a:t>
             </a:fld>
             <a:endParaRPr lang="en-MY"/>
           </a:p>
@@ -1979,7 +1979,7 @@
           <a:p>
             <a:fld id="{7328651E-CDC9-4A3C-9569-A439AFE4551F}" type="datetimeFigureOut">
               <a:rPr lang="en-MY" smtClean="0"/>
-              <a:t>2/12/2025</a:t>
+              <a:t>10/12/2025</a:t>
             </a:fld>
             <a:endParaRPr lang="en-MY"/>
           </a:p>
@@ -2092,7 +2092,7 @@
           <a:p>
             <a:fld id="{7328651E-CDC9-4A3C-9569-A439AFE4551F}" type="datetimeFigureOut">
               <a:rPr lang="en-MY" smtClean="0"/>
-              <a:t>2/12/2025</a:t>
+              <a:t>10/12/2025</a:t>
             </a:fld>
             <a:endParaRPr lang="en-MY"/>
           </a:p>
@@ -2405,7 +2405,7 @@
           <a:p>
             <a:fld id="{7328651E-CDC9-4A3C-9569-A439AFE4551F}" type="datetimeFigureOut">
               <a:rPr lang="en-MY" smtClean="0"/>
-              <a:t>2/12/2025</a:t>
+              <a:t>10/12/2025</a:t>
             </a:fld>
             <a:endParaRPr lang="en-MY"/>
           </a:p>
@@ -2694,7 +2694,7 @@
           <a:p>
             <a:fld id="{7328651E-CDC9-4A3C-9569-A439AFE4551F}" type="datetimeFigureOut">
               <a:rPr lang="en-MY" smtClean="0"/>
-              <a:t>2/12/2025</a:t>
+              <a:t>10/12/2025</a:t>
             </a:fld>
             <a:endParaRPr lang="en-MY"/>
           </a:p>
@@ -2937,7 +2937,7 @@
           <a:p>
             <a:fld id="{7328651E-CDC9-4A3C-9569-A439AFE4551F}" type="datetimeFigureOut">
               <a:rPr lang="en-MY" smtClean="0"/>
-              <a:t>2/12/2025</a:t>
+              <a:t>10/12/2025</a:t>
             </a:fld>
             <a:endParaRPr lang="en-MY"/>
           </a:p>
@@ -3345,7 +3345,7 @@
         <p:cNvPr id="1" name="">
           <a:extLst>
             <a:ext uri="{FF2B5EF4-FFF2-40B4-BE49-F238E27FC236}">
-              <a16:creationId xmlns:a16="http://schemas.microsoft.com/office/drawing/2014/main" id="{69AD772B-742B-149C-2D92-66CBEEA8EF34}"/>
+              <a16:creationId xmlns:a16="http://schemas.microsoft.com/office/drawing/2014/main" id="{6A564E8B-0BAE-2A8D-6C8C-9D2620D40504}"/>
             </a:ext>
           </a:extLst>
         </p:cNvPr>
@@ -3365,7 +3365,7 @@
           <p:cNvPr id="7" name="Rectangle 6">
             <a:extLst>
               <a:ext uri="{FF2B5EF4-FFF2-40B4-BE49-F238E27FC236}">
-                <a16:creationId xmlns:a16="http://schemas.microsoft.com/office/drawing/2014/main" id="{F2BDE620-5841-9741-2E97-CF9889B39E09}"/>
+                <a16:creationId xmlns:a16="http://schemas.microsoft.com/office/drawing/2014/main" id="{2CBEA06B-FB97-BF9E-97E7-7B5528CB9E4B}"/>
               </a:ext>
             </a:extLst>
           </p:cNvPr>
@@ -3425,7 +3425,7 @@
           <p:cNvPr id="8" name="Rectangle 7">
             <a:extLst>
               <a:ext uri="{FF2B5EF4-FFF2-40B4-BE49-F238E27FC236}">
-                <a16:creationId xmlns:a16="http://schemas.microsoft.com/office/drawing/2014/main" id="{DF4C68FD-A6E0-A851-3EE7-829CA9C6A4D4}"/>
+                <a16:creationId xmlns:a16="http://schemas.microsoft.com/office/drawing/2014/main" id="{29DA7A3C-031B-D2F1-A819-A4E7646816C2}"/>
               </a:ext>
             </a:extLst>
           </p:cNvPr>
@@ -3485,7 +3485,7 @@
           <p:cNvPr id="9" name="Rectangle 8">
             <a:extLst>
               <a:ext uri="{FF2B5EF4-FFF2-40B4-BE49-F238E27FC236}">
-                <a16:creationId xmlns:a16="http://schemas.microsoft.com/office/drawing/2014/main" id="{42C71063-0BC4-2878-E09D-C2EEE58E4600}"/>
+                <a16:creationId xmlns:a16="http://schemas.microsoft.com/office/drawing/2014/main" id="{257B5D8D-681D-27B8-1B35-AE4307ED8271}"/>
               </a:ext>
             </a:extLst>
           </p:cNvPr>
@@ -3545,7 +3545,7 @@
           <p:cNvPr id="10" name="Rectangle 9">
             <a:extLst>
               <a:ext uri="{FF2B5EF4-FFF2-40B4-BE49-F238E27FC236}">
-                <a16:creationId xmlns:a16="http://schemas.microsoft.com/office/drawing/2014/main" id="{EC0D194B-8366-8822-4EA5-ECA78213D8F4}"/>
+                <a16:creationId xmlns:a16="http://schemas.microsoft.com/office/drawing/2014/main" id="{66FCFAC0-BDAD-214A-F8A6-A5984B29F34B}"/>
               </a:ext>
             </a:extLst>
           </p:cNvPr>
@@ -3605,7 +3605,7 @@
           <p:cNvPr id="11" name="Rectangle 10">
             <a:extLst>
               <a:ext uri="{FF2B5EF4-FFF2-40B4-BE49-F238E27FC236}">
-                <a16:creationId xmlns:a16="http://schemas.microsoft.com/office/drawing/2014/main" id="{706E6960-2537-DC7E-0758-002C6F1A137E}"/>
+                <a16:creationId xmlns:a16="http://schemas.microsoft.com/office/drawing/2014/main" id="{3F7C1BDF-2133-8756-2909-62DD3812625A}"/>
               </a:ext>
             </a:extLst>
           </p:cNvPr>
@@ -3662,7 +3662,7 @@
                   <a:schemeClr val="tx1"/>
                 </a:solidFill>
               </a:rPr>
-              <a:t>Public Subnet (202.165.17.46)</a:t>
+              <a:t>Web Subnet (202.165.17.46)</a:t>
             </a:r>
             <a:endParaRPr lang="en-MY" sz="1400" dirty="0">
               <a:solidFill>
@@ -3677,7 +3677,7 @@
           <p:cNvPr id="12" name="Rectangle 11">
             <a:extLst>
               <a:ext uri="{FF2B5EF4-FFF2-40B4-BE49-F238E27FC236}">
-                <a16:creationId xmlns:a16="http://schemas.microsoft.com/office/drawing/2014/main" id="{168EDC5F-FCEA-5F91-ED8C-6469EDDE7595}"/>
+                <a16:creationId xmlns:a16="http://schemas.microsoft.com/office/drawing/2014/main" id="{6A85C5C6-A131-252E-EBEF-6B2042FBA88D}"/>
               </a:ext>
             </a:extLst>
           </p:cNvPr>
@@ -3734,7 +3734,7 @@
                   <a:schemeClr val="tx1"/>
                 </a:solidFill>
               </a:rPr>
-              <a:t>Private Subnet/App (202.165.29.35)</a:t>
+              <a:t>App Subnet (202.165.29.35)</a:t>
             </a:r>
             <a:endParaRPr lang="en-MY" sz="1400" dirty="0">
               <a:solidFill>
@@ -3749,7 +3749,7 @@
           <p:cNvPr id="13" name="Rectangle 12">
             <a:extLst>
               <a:ext uri="{FF2B5EF4-FFF2-40B4-BE49-F238E27FC236}">
-                <a16:creationId xmlns:a16="http://schemas.microsoft.com/office/drawing/2014/main" id="{367852DD-44CC-1DA6-E9AC-F671BD969B68}"/>
+                <a16:creationId xmlns:a16="http://schemas.microsoft.com/office/drawing/2014/main" id="{D84822EA-DCE5-3CA8-EA81-9537F66D03B3}"/>
               </a:ext>
             </a:extLst>
           </p:cNvPr>
@@ -3806,7 +3806,7 @@
                   <a:schemeClr val="tx1"/>
                 </a:solidFill>
               </a:rPr>
-              <a:t>Private Subnet/Data ()</a:t>
+              <a:t>Database Subnet ()</a:t>
             </a:r>
             <a:endParaRPr lang="en-MY" sz="1400" dirty="0">
               <a:solidFill>
@@ -3821,7 +3821,7 @@
           <p:cNvPr id="14" name="Rectangle 13">
             <a:extLst>
               <a:ext uri="{FF2B5EF4-FFF2-40B4-BE49-F238E27FC236}">
-                <a16:creationId xmlns:a16="http://schemas.microsoft.com/office/drawing/2014/main" id="{C758E85A-D278-03C2-FBC2-DBC42E7EC2D4}"/>
+                <a16:creationId xmlns:a16="http://schemas.microsoft.com/office/drawing/2014/main" id="{361178DD-BDA7-875A-6270-FA02A422E79D}"/>
               </a:ext>
             </a:extLst>
           </p:cNvPr>
@@ -3830,7 +3830,7 @@
         </p:nvSpPr>
         <p:spPr>
           <a:xfrm>
-            <a:off x="2214194" y="1165485"/>
+            <a:off x="2128026" y="1214953"/>
             <a:ext cx="1136822" cy="725278"/>
           </a:xfrm>
           <a:prstGeom prst="rect">
@@ -3871,7 +3871,7 @@
                 </a:solidFill>
                 <a:latin typeface="+mj-lt"/>
               </a:rPr>
-              <a:t>ECS - Bastion</a:t>
+              <a:t>ECS </a:t>
             </a:r>
             <a:endParaRPr lang="en-MY" dirty="0">
               <a:solidFill>
@@ -3887,7 +3887,7 @@
           <p:cNvPr id="17" name="Rectangle 16">
             <a:extLst>
               <a:ext uri="{FF2B5EF4-FFF2-40B4-BE49-F238E27FC236}">
-                <a16:creationId xmlns:a16="http://schemas.microsoft.com/office/drawing/2014/main" id="{84EDDA4F-BE9D-E5E2-9B93-53F0D48F9105}"/>
+                <a16:creationId xmlns:a16="http://schemas.microsoft.com/office/drawing/2014/main" id="{BA02BBBB-F0B7-9B0A-C82D-7E3A5E752F4C}"/>
               </a:ext>
             </a:extLst>
           </p:cNvPr>
@@ -3896,7 +3896,7 @@
         </p:nvSpPr>
         <p:spPr>
           <a:xfrm>
-            <a:off x="3670409" y="1305443"/>
+            <a:off x="3498073" y="1093360"/>
             <a:ext cx="1136822" cy="432486"/>
           </a:xfrm>
           <a:prstGeom prst="rect">
@@ -3953,7 +3953,7 @@
           <p:cNvPr id="20" name="Rectangle 19">
             <a:extLst>
               <a:ext uri="{FF2B5EF4-FFF2-40B4-BE49-F238E27FC236}">
-                <a16:creationId xmlns:a16="http://schemas.microsoft.com/office/drawing/2014/main" id="{F25F68D6-0C94-DBE4-CD7D-A28720EA76F4}"/>
+                <a16:creationId xmlns:a16="http://schemas.microsoft.com/office/drawing/2014/main" id="{311546C9-E909-3379-C637-F929F2A44A1F}"/>
               </a:ext>
             </a:extLst>
           </p:cNvPr>
@@ -3962,7 +3962,7 @@
         </p:nvSpPr>
         <p:spPr>
           <a:xfrm>
-            <a:off x="3632243" y="5187264"/>
+            <a:off x="2405620" y="5204801"/>
             <a:ext cx="1136822" cy="432486"/>
           </a:xfrm>
           <a:prstGeom prst="rect">
@@ -4007,7 +4007,7 @@
           <p:cNvPr id="23" name="Rectangle 22">
             <a:extLst>
               <a:ext uri="{FF2B5EF4-FFF2-40B4-BE49-F238E27FC236}">
-                <a16:creationId xmlns:a16="http://schemas.microsoft.com/office/drawing/2014/main" id="{10FDCB99-9F6D-72A1-8BAD-AE5D52DB8875}"/>
+                <a16:creationId xmlns:a16="http://schemas.microsoft.com/office/drawing/2014/main" id="{CA125A6A-C20B-EF02-9675-6806416AE65F}"/>
               </a:ext>
             </a:extLst>
           </p:cNvPr>
@@ -4016,7 +4016,7 @@
         </p:nvSpPr>
         <p:spPr>
           <a:xfrm>
-            <a:off x="6737441" y="5762365"/>
+            <a:off x="3913144" y="5833711"/>
             <a:ext cx="1136822" cy="432486"/>
           </a:xfrm>
           <a:prstGeom prst="rect">
@@ -4048,7 +4048,7 @@
               <a:rPr lang="en-US" dirty="0">
                 <a:latin typeface="+mj-lt"/>
               </a:rPr>
-              <a:t>API</a:t>
+              <a:t>APIG</a:t>
             </a:r>
             <a:endParaRPr lang="en-MY" dirty="0">
               <a:latin typeface="+mj-lt"/>
@@ -4061,7 +4061,7 @@
           <p:cNvPr id="29" name="Rectangle 28">
             <a:extLst>
               <a:ext uri="{FF2B5EF4-FFF2-40B4-BE49-F238E27FC236}">
-                <a16:creationId xmlns:a16="http://schemas.microsoft.com/office/drawing/2014/main" id="{4A0EAC9D-3377-5B2A-2E33-9583E5DABFFA}"/>
+                <a16:creationId xmlns:a16="http://schemas.microsoft.com/office/drawing/2014/main" id="{52521022-7180-7977-B6D1-92F070497CCF}"/>
               </a:ext>
             </a:extLst>
           </p:cNvPr>
@@ -4115,7 +4115,7 @@
           <p:cNvPr id="30" name="Picture 29">
             <a:extLst>
               <a:ext uri="{FF2B5EF4-FFF2-40B4-BE49-F238E27FC236}">
-                <a16:creationId xmlns:a16="http://schemas.microsoft.com/office/drawing/2014/main" id="{1C8DC9F8-3C57-679E-E3A0-852AD55AD401}"/>
+                <a16:creationId xmlns:a16="http://schemas.microsoft.com/office/drawing/2014/main" id="{C0A25AB9-A5A2-B219-A77C-67DE5338859F}"/>
               </a:ext>
             </a:extLst>
           </p:cNvPr>
@@ -4132,7 +4132,7 @@
         </p:blipFill>
         <p:spPr>
           <a:xfrm>
-            <a:off x="11068733" y="3015128"/>
+            <a:off x="10884229" y="342192"/>
             <a:ext cx="664007" cy="337111"/>
           </a:xfrm>
           <a:prstGeom prst="rect">
@@ -4145,7 +4145,7 @@
           <p:cNvPr id="31" name="Rectangle 30">
             <a:extLst>
               <a:ext uri="{FF2B5EF4-FFF2-40B4-BE49-F238E27FC236}">
-                <a16:creationId xmlns:a16="http://schemas.microsoft.com/office/drawing/2014/main" id="{3E0AD6D5-15C4-8E79-541E-F02FBDF1DAAF}"/>
+                <a16:creationId xmlns:a16="http://schemas.microsoft.com/office/drawing/2014/main" id="{1239E37E-5C08-E307-E216-B5CDC1B0511A}"/>
               </a:ext>
             </a:extLst>
           </p:cNvPr>
@@ -4199,7 +4199,7 @@
           <p:cNvPr id="32" name="Rectangle 31">
             <a:extLst>
               <a:ext uri="{FF2B5EF4-FFF2-40B4-BE49-F238E27FC236}">
-                <a16:creationId xmlns:a16="http://schemas.microsoft.com/office/drawing/2014/main" id="{8E2D695A-BA19-9202-414C-420F8C9F8C7F}"/>
+                <a16:creationId xmlns:a16="http://schemas.microsoft.com/office/drawing/2014/main" id="{DC45C8B1-6A4E-99C5-F56D-C1C7677B200C}"/>
               </a:ext>
             </a:extLst>
           </p:cNvPr>
@@ -4253,7 +4253,7 @@
           <p:cNvPr id="62" name="Rectangle 61">
             <a:extLst>
               <a:ext uri="{FF2B5EF4-FFF2-40B4-BE49-F238E27FC236}">
-                <a16:creationId xmlns:a16="http://schemas.microsoft.com/office/drawing/2014/main" id="{05F0516D-5128-A72E-361A-216BA8171B49}"/>
+                <a16:creationId xmlns:a16="http://schemas.microsoft.com/office/drawing/2014/main" id="{1F9BA9BE-A64D-3F60-AC03-E7CA6FB3771B}"/>
               </a:ext>
             </a:extLst>
           </p:cNvPr>
@@ -4307,7 +4307,7 @@
           <p:cNvPr id="89" name="TextBox 88">
             <a:extLst>
               <a:ext uri="{FF2B5EF4-FFF2-40B4-BE49-F238E27FC236}">
-                <a16:creationId xmlns:a16="http://schemas.microsoft.com/office/drawing/2014/main" id="{DF600BD8-64D6-314D-65B7-972A2987FD45}"/>
+                <a16:creationId xmlns:a16="http://schemas.microsoft.com/office/drawing/2014/main" id="{17A4D814-A9C4-D963-7DB4-E0A4B0817FB3}"/>
               </a:ext>
             </a:extLst>
           </p:cNvPr>
@@ -4316,7 +4316,7 @@
         </p:nvSpPr>
         <p:spPr>
           <a:xfrm>
-            <a:off x="11017068" y="3375892"/>
+            <a:off x="10884229" y="784531"/>
             <a:ext cx="715672" cy="253916"/>
           </a:xfrm>
           <a:prstGeom prst="rect">
@@ -4344,7 +4344,7 @@
           <p:cNvPr id="92" name="Rectangle 91">
             <a:extLst>
               <a:ext uri="{FF2B5EF4-FFF2-40B4-BE49-F238E27FC236}">
-                <a16:creationId xmlns:a16="http://schemas.microsoft.com/office/drawing/2014/main" id="{A1DCE6A0-0345-0615-8E4A-6877F54A0FD6}"/>
+                <a16:creationId xmlns:a16="http://schemas.microsoft.com/office/drawing/2014/main" id="{94E0165B-C723-3E48-C6F0-42C861C41BC7}"/>
               </a:ext>
             </a:extLst>
           </p:cNvPr>
@@ -4433,7 +4433,7 @@
           <p:cNvPr id="22" name="Rectangle 21">
             <a:extLst>
               <a:ext uri="{FF2B5EF4-FFF2-40B4-BE49-F238E27FC236}">
-                <a16:creationId xmlns:a16="http://schemas.microsoft.com/office/drawing/2014/main" id="{CCD08886-80A4-E126-1187-93D7A457B690}"/>
+                <a16:creationId xmlns:a16="http://schemas.microsoft.com/office/drawing/2014/main" id="{F9D0554E-C7A6-07A2-1967-A4541EA7D741}"/>
               </a:ext>
             </a:extLst>
           </p:cNvPr>
@@ -4442,7 +4442,7 @@
         </p:nvSpPr>
         <p:spPr>
           <a:xfrm>
-            <a:off x="5420720" y="5762365"/>
+            <a:off x="3913144" y="5197562"/>
             <a:ext cx="1136822" cy="432486"/>
           </a:xfrm>
           <a:prstGeom prst="rect">
@@ -4487,7 +4487,7 @@
           <p:cNvPr id="5" name="Rectangle 4">
             <a:extLst>
               <a:ext uri="{FF2B5EF4-FFF2-40B4-BE49-F238E27FC236}">
-                <a16:creationId xmlns:a16="http://schemas.microsoft.com/office/drawing/2014/main" id="{16C3D8C1-8BA5-1B0E-9327-7BB55E9F1FD9}"/>
+                <a16:creationId xmlns:a16="http://schemas.microsoft.com/office/drawing/2014/main" id="{204697A0-2532-E548-9BAB-6E8B18415EE3}"/>
               </a:ext>
             </a:extLst>
           </p:cNvPr>
@@ -4496,7 +4496,70 @@
         </p:nvSpPr>
         <p:spPr>
           <a:xfrm>
-            <a:off x="5420720" y="5161877"/>
+            <a:off x="3727538" y="3959212"/>
+            <a:ext cx="1136822" cy="649829"/>
+          </a:xfrm>
+          <a:prstGeom prst="rect">
+            <a:avLst/>
+          </a:prstGeom>
+        </p:spPr>
+        <p:style>
+          <a:lnRef idx="2">
+            <a:schemeClr val="accent1">
+              <a:shade val="50000"/>
+            </a:schemeClr>
+          </a:lnRef>
+          <a:fillRef idx="1">
+            <a:schemeClr val="accent1"/>
+          </a:fillRef>
+          <a:effectRef idx="0">
+            <a:schemeClr val="accent1"/>
+          </a:effectRef>
+          <a:fontRef idx="minor">
+            <a:schemeClr val="lt1"/>
+          </a:fontRef>
+        </p:style>
+        <p:txBody>
+          <a:bodyPr rtlCol="0" anchor="ctr"/>
+          <a:lstStyle/>
+          <a:p>
+            <a:pPr algn="ctr"/>
+            <a:r>
+              <a:rPr lang="en-US" dirty="0">
+                <a:latin typeface="+mj-lt"/>
+              </a:rPr>
+              <a:t>DAYU</a:t>
+            </a:r>
+          </a:p>
+          <a:p>
+            <a:pPr algn="ctr"/>
+            <a:r>
+              <a:rPr lang="en-US" dirty="0">
+                <a:latin typeface="+mj-lt"/>
+              </a:rPr>
+              <a:t>(CDM)</a:t>
+            </a:r>
+            <a:endParaRPr lang="en-MY" dirty="0">
+              <a:latin typeface="+mj-lt"/>
+            </a:endParaRPr>
+          </a:p>
+        </p:txBody>
+      </p:sp>
+      <p:sp>
+        <p:nvSpPr>
+          <p:cNvPr id="6" name="Rectangle 5">
+            <a:extLst>
+              <a:ext uri="{FF2B5EF4-FFF2-40B4-BE49-F238E27FC236}">
+                <a16:creationId xmlns:a16="http://schemas.microsoft.com/office/drawing/2014/main" id="{D5E38C52-C311-39C2-60C4-2B58CCD9485E}"/>
+              </a:ext>
+            </a:extLst>
+          </p:cNvPr>
+          <p:cNvSpPr/>
+          <p:nvPr/>
+        </p:nvSpPr>
+        <p:spPr>
+          <a:xfrm>
+            <a:off x="2175900" y="4146052"/>
             <a:ext cx="1136822" cy="432486"/>
           </a:xfrm>
           <a:prstGeom prst="rect">
@@ -4525,10 +4588,64 @@
           <a:p>
             <a:pPr algn="ctr"/>
             <a:r>
+              <a:rPr lang="en-US" sz="1200" dirty="0" err="1">
+                <a:latin typeface="+mj-lt"/>
+              </a:rPr>
+              <a:t>FunctionGraph</a:t>
+            </a:r>
+            <a:endParaRPr lang="en-MY" sz="1200" dirty="0">
+              <a:latin typeface="+mj-lt"/>
+            </a:endParaRPr>
+          </a:p>
+        </p:txBody>
+      </p:sp>
+      <p:sp>
+        <p:nvSpPr>
+          <p:cNvPr id="24" name="Rectangle 23">
+            <a:extLst>
+              <a:ext uri="{FF2B5EF4-FFF2-40B4-BE49-F238E27FC236}">
+                <a16:creationId xmlns:a16="http://schemas.microsoft.com/office/drawing/2014/main" id="{898763A5-758D-447F-D333-6EAAC53C3667}"/>
+              </a:ext>
+            </a:extLst>
+          </p:cNvPr>
+          <p:cNvSpPr/>
+          <p:nvPr/>
+        </p:nvSpPr>
+        <p:spPr>
+          <a:xfrm>
+            <a:off x="225119" y="4685817"/>
+            <a:ext cx="1124469" cy="735227"/>
+          </a:xfrm>
+          <a:prstGeom prst="rect">
+            <a:avLst/>
+          </a:prstGeom>
+        </p:spPr>
+        <p:style>
+          <a:lnRef idx="2">
+            <a:schemeClr val="accent1">
+              <a:shade val="50000"/>
+            </a:schemeClr>
+          </a:lnRef>
+          <a:fillRef idx="1">
+            <a:schemeClr val="accent1"/>
+          </a:fillRef>
+          <a:effectRef idx="0">
+            <a:schemeClr val="accent1"/>
+          </a:effectRef>
+          <a:fontRef idx="minor">
+            <a:schemeClr val="lt1"/>
+          </a:fontRef>
+        </p:style>
+        <p:txBody>
+          <a:bodyPr rtlCol="0" anchor="ctr"/>
+          <a:lstStyle/>
+          <a:p>
+            <a:pPr algn="ctr"/>
+            <a:r>
               <a:rPr lang="en-US" dirty="0">
                 <a:latin typeface="+mj-lt"/>
               </a:rPr>
-              <a:t>DLI</a:t>
+              <a:t>PETRA</a:t>
             </a:r>
             <a:endParaRPr lang="en-MY" dirty="0">
               <a:latin typeface="+mj-lt"/>
@@ -4538,10 +4655,10 @@
       </p:sp>
       <p:sp>
         <p:nvSpPr>
-          <p:cNvPr id="6" name="Rectangle 5">
-            <a:extLst>
-              <a:ext uri="{FF2B5EF4-FFF2-40B4-BE49-F238E27FC236}">
-                <a16:creationId xmlns:a16="http://schemas.microsoft.com/office/drawing/2014/main" id="{3A171948-45AB-E600-89F6-3A1C853CA6B9}"/>
+          <p:cNvPr id="25" name="Rectangle 24">
+            <a:extLst>
+              <a:ext uri="{FF2B5EF4-FFF2-40B4-BE49-F238E27FC236}">
+                <a16:creationId xmlns:a16="http://schemas.microsoft.com/office/drawing/2014/main" id="{E1A144F5-4F0C-1146-57BF-5DA66E75A235}"/>
               </a:ext>
             </a:extLst>
           </p:cNvPr>
@@ -4550,7 +4667,73 @@
         </p:nvSpPr>
         <p:spPr>
           <a:xfrm>
-            <a:off x="2124719" y="5194650"/>
+            <a:off x="3498073" y="1577592"/>
+            <a:ext cx="1136822" cy="432486"/>
+          </a:xfrm>
+          <a:prstGeom prst="rect">
+            <a:avLst/>
+          </a:prstGeom>
+          <a:solidFill>
+            <a:schemeClr val="accent1">
+              <a:lumMod val="60000"/>
+              <a:lumOff val="40000"/>
+            </a:schemeClr>
+          </a:solidFill>
+        </p:spPr>
+        <p:style>
+          <a:lnRef idx="2">
+            <a:schemeClr val="accent1">
+              <a:shade val="50000"/>
+            </a:schemeClr>
+          </a:lnRef>
+          <a:fillRef idx="1">
+            <a:schemeClr val="accent1"/>
+          </a:fillRef>
+          <a:effectRef idx="0">
+            <a:schemeClr val="accent1"/>
+          </a:effectRef>
+          <a:fontRef idx="minor">
+            <a:schemeClr val="lt1"/>
+          </a:fontRef>
+        </p:style>
+        <p:txBody>
+          <a:bodyPr rtlCol="0" anchor="ctr"/>
+          <a:lstStyle/>
+          <a:p>
+            <a:pPr algn="ctr"/>
+            <a:r>
+              <a:rPr lang="en-US" dirty="0">
+                <a:solidFill>
+                  <a:schemeClr val="tx1"/>
+                </a:solidFill>
+                <a:latin typeface="+mj-lt"/>
+              </a:rPr>
+              <a:t>API</a:t>
+            </a:r>
+            <a:endParaRPr lang="en-MY" dirty="0">
+              <a:solidFill>
+                <a:schemeClr val="tx1"/>
+              </a:solidFill>
+              <a:latin typeface="+mj-lt"/>
+            </a:endParaRPr>
+          </a:p>
+        </p:txBody>
+      </p:sp>
+      <p:sp>
+        <p:nvSpPr>
+          <p:cNvPr id="26" name="Rectangle 25">
+            <a:extLst>
+              <a:ext uri="{FF2B5EF4-FFF2-40B4-BE49-F238E27FC236}">
+                <a16:creationId xmlns:a16="http://schemas.microsoft.com/office/drawing/2014/main" id="{AABAD863-6BC1-ED7E-D8C3-C3A5668ACC7C}"/>
+              </a:ext>
+            </a:extLst>
+          </p:cNvPr>
+          <p:cNvSpPr/>
+          <p:nvPr/>
+        </p:nvSpPr>
+        <p:spPr>
+          <a:xfrm>
+            <a:off x="2405620" y="5832390"/>
             <a:ext cx="1136822" cy="432486"/>
           </a:xfrm>
           <a:prstGeom prst="rect">
@@ -4579,12 +4762,12 @@
           <a:p>
             <a:pPr algn="ctr"/>
             <a:r>
-              <a:rPr lang="en-US" sz="1200" dirty="0" err="1">
+              <a:rPr lang="en-US" dirty="0">
                 <a:latin typeface="+mj-lt"/>
               </a:rPr>
-              <a:t>FunctionGraph</a:t>
-            </a:r>
-            <a:endParaRPr lang="en-MY" sz="1200" dirty="0">
+              <a:t>CSS</a:t>
+            </a:r>
+            <a:endParaRPr lang="en-MY" dirty="0">
               <a:latin typeface="+mj-lt"/>
             </a:endParaRPr>
           </a:p>
@@ -4592,10 +4775,10 @@
       </p:sp>
       <p:sp>
         <p:nvSpPr>
-          <p:cNvPr id="15" name="Rectangle 14">
-            <a:extLst>
-              <a:ext uri="{FF2B5EF4-FFF2-40B4-BE49-F238E27FC236}">
-                <a16:creationId xmlns:a16="http://schemas.microsoft.com/office/drawing/2014/main" id="{04CE8E68-5430-B93D-0B38-FBD1CF949F70}"/>
+          <p:cNvPr id="2" name="Rectangle 1">
+            <a:extLst>
+              <a:ext uri="{FF2B5EF4-FFF2-40B4-BE49-F238E27FC236}">
+                <a16:creationId xmlns:a16="http://schemas.microsoft.com/office/drawing/2014/main" id="{2F738028-8AE6-EDFD-727C-49E6671504F7}"/>
               </a:ext>
             </a:extLst>
           </p:cNvPr>
@@ -4604,7 +4787,7 @@
         </p:nvSpPr>
         <p:spPr>
           <a:xfrm>
-            <a:off x="3966515" y="3261524"/>
+            <a:off x="2175900" y="3145486"/>
             <a:ext cx="1136822" cy="725278"/>
           </a:xfrm>
           <a:prstGeom prst="rect">
@@ -4645,7 +4828,37 @@
                 </a:solidFill>
                 <a:latin typeface="+mj-lt"/>
               </a:rPr>
-              <a:t>ECS - App</a:t>
+              <a:t>ECS</a:t>
+            </a:r>
+          </a:p>
+          <a:p>
+            <a:pPr algn="ctr"/>
+            <a:r>
+              <a:rPr lang="en-US" dirty="0">
+                <a:solidFill>
+                  <a:schemeClr val="tx1"/>
+                </a:solidFill>
+                <a:latin typeface="+mj-lt"/>
+              </a:rPr>
+              <a:t>(</a:t>
+            </a:r>
+            <a:r>
+              <a:rPr lang="en-US" dirty="0" err="1">
+                <a:solidFill>
+                  <a:schemeClr val="tx1"/>
+                </a:solidFill>
+                <a:latin typeface="+mj-lt"/>
+              </a:rPr>
+              <a:t>Coolify</a:t>
+            </a:r>
+            <a:r>
+              <a:rPr lang="en-US" dirty="0">
+                <a:solidFill>
+                  <a:schemeClr val="tx1"/>
+                </a:solidFill>
+                <a:latin typeface="+mj-lt"/>
+              </a:rPr>
+              <a:t>)</a:t>
             </a:r>
             <a:endParaRPr lang="en-MY" dirty="0">
               <a:solidFill>
@@ -4658,10 +4871,10 @@
       </p:sp>
       <p:sp>
         <p:nvSpPr>
-          <p:cNvPr id="16" name="Rectangle 15">
-            <a:extLst>
-              <a:ext uri="{FF2B5EF4-FFF2-40B4-BE49-F238E27FC236}">
-                <a16:creationId xmlns:a16="http://schemas.microsoft.com/office/drawing/2014/main" id="{6DFF3EE1-C68D-D337-B5E2-5906F71A81A3}"/>
+          <p:cNvPr id="4" name="Rectangle 3">
+            <a:extLst>
+              <a:ext uri="{FF2B5EF4-FFF2-40B4-BE49-F238E27FC236}">
+                <a16:creationId xmlns:a16="http://schemas.microsoft.com/office/drawing/2014/main" id="{AFCD89CE-32ED-538C-B6F1-DA40D5F58918}"/>
               </a:ext>
             </a:extLst>
           </p:cNvPr>
@@ -4670,193 +4883,7 @@
         </p:nvSpPr>
         <p:spPr>
           <a:xfrm>
-            <a:off x="5420720" y="3261524"/>
-            <a:ext cx="1136822" cy="725278"/>
-          </a:xfrm>
-          <a:prstGeom prst="rect">
-            <a:avLst/>
-          </a:prstGeom>
-          <a:solidFill>
-            <a:schemeClr val="accent1">
-              <a:lumMod val="60000"/>
-              <a:lumOff val="40000"/>
-            </a:schemeClr>
-          </a:solidFill>
-        </p:spPr>
-        <p:style>
-          <a:lnRef idx="2">
-            <a:schemeClr val="accent1">
-              <a:shade val="50000"/>
-            </a:schemeClr>
-          </a:lnRef>
-          <a:fillRef idx="1">
-            <a:schemeClr val="accent1"/>
-          </a:fillRef>
-          <a:effectRef idx="0">
-            <a:schemeClr val="accent1"/>
-          </a:effectRef>
-          <a:fontRef idx="minor">
-            <a:schemeClr val="lt1"/>
-          </a:fontRef>
-        </p:style>
-        <p:txBody>
-          <a:bodyPr rtlCol="0" anchor="ctr"/>
-          <a:lstStyle/>
-          <a:p>
-            <a:pPr algn="ctr"/>
-            <a:r>
-              <a:rPr lang="en-US" dirty="0">
-                <a:solidFill>
-                  <a:schemeClr val="tx1"/>
-                </a:solidFill>
-                <a:latin typeface="+mj-lt"/>
-              </a:rPr>
-              <a:t>EVS (500 + 500)</a:t>
-            </a:r>
-            <a:endParaRPr lang="en-MY" dirty="0">
-              <a:solidFill>
-                <a:schemeClr val="tx1"/>
-              </a:solidFill>
-              <a:latin typeface="+mj-lt"/>
-            </a:endParaRPr>
-          </a:p>
-        </p:txBody>
-      </p:sp>
-      <p:sp>
-        <p:nvSpPr>
-          <p:cNvPr id="24" name="Rectangle 23">
-            <a:extLst>
-              <a:ext uri="{FF2B5EF4-FFF2-40B4-BE49-F238E27FC236}">
-                <a16:creationId xmlns:a16="http://schemas.microsoft.com/office/drawing/2014/main" id="{39C4E8BD-5B35-E088-24DB-8A2855D9BC24}"/>
-              </a:ext>
-            </a:extLst>
-          </p:cNvPr>
-          <p:cNvSpPr/>
-          <p:nvPr/>
-        </p:nvSpPr>
-        <p:spPr>
-          <a:xfrm>
-            <a:off x="225119" y="4685817"/>
-            <a:ext cx="1124469" cy="735227"/>
-          </a:xfrm>
-          <a:prstGeom prst="rect">
-            <a:avLst/>
-          </a:prstGeom>
-        </p:spPr>
-        <p:style>
-          <a:lnRef idx="2">
-            <a:schemeClr val="accent1">
-              <a:shade val="50000"/>
-            </a:schemeClr>
-          </a:lnRef>
-          <a:fillRef idx="1">
-            <a:schemeClr val="accent1"/>
-          </a:fillRef>
-          <a:effectRef idx="0">
-            <a:schemeClr val="accent1"/>
-          </a:effectRef>
-          <a:fontRef idx="minor">
-            <a:schemeClr val="lt1"/>
-          </a:fontRef>
-        </p:style>
-        <p:txBody>
-          <a:bodyPr rtlCol="0" anchor="ctr"/>
-          <a:lstStyle/>
-          <a:p>
-            <a:pPr algn="ctr"/>
-            <a:r>
-              <a:rPr lang="en-US" dirty="0">
-                <a:latin typeface="+mj-lt"/>
-              </a:rPr>
-              <a:t>PETRA</a:t>
-            </a:r>
-            <a:endParaRPr lang="en-MY" dirty="0">
-              <a:latin typeface="+mj-lt"/>
-            </a:endParaRPr>
-          </a:p>
-        </p:txBody>
-      </p:sp>
-      <p:sp>
-        <p:nvSpPr>
-          <p:cNvPr id="25" name="Rectangle 24">
-            <a:extLst>
-              <a:ext uri="{FF2B5EF4-FFF2-40B4-BE49-F238E27FC236}">
-                <a16:creationId xmlns:a16="http://schemas.microsoft.com/office/drawing/2014/main" id="{71EDBCF3-ABFE-926B-D7C6-AA3F699EB473}"/>
-              </a:ext>
-            </a:extLst>
-          </p:cNvPr>
-          <p:cNvSpPr/>
-          <p:nvPr/>
-        </p:nvSpPr>
-        <p:spPr>
-          <a:xfrm>
-            <a:off x="2470680" y="3398672"/>
-            <a:ext cx="1136822" cy="432486"/>
-          </a:xfrm>
-          <a:prstGeom prst="rect">
-            <a:avLst/>
-          </a:prstGeom>
-          <a:solidFill>
-            <a:schemeClr val="accent1">
-              <a:lumMod val="60000"/>
-              <a:lumOff val="40000"/>
-            </a:schemeClr>
-          </a:solidFill>
-        </p:spPr>
-        <p:style>
-          <a:lnRef idx="2">
-            <a:schemeClr val="accent1">
-              <a:shade val="50000"/>
-            </a:schemeClr>
-          </a:lnRef>
-          <a:fillRef idx="1">
-            <a:schemeClr val="accent1"/>
-          </a:fillRef>
-          <a:effectRef idx="0">
-            <a:schemeClr val="accent1"/>
-          </a:effectRef>
-          <a:fontRef idx="minor">
-            <a:schemeClr val="lt1"/>
-          </a:fontRef>
-        </p:style>
-        <p:txBody>
-          <a:bodyPr rtlCol="0" anchor="ctr"/>
-          <a:lstStyle/>
-          <a:p>
-            <a:pPr algn="ctr"/>
-            <a:r>
-              <a:rPr lang="en-US" dirty="0">
-                <a:solidFill>
-                  <a:schemeClr val="tx1"/>
-                </a:solidFill>
-                <a:latin typeface="+mj-lt"/>
-              </a:rPr>
-              <a:t>APIG</a:t>
-            </a:r>
-            <a:endParaRPr lang="en-MY" dirty="0">
-              <a:solidFill>
-                <a:schemeClr val="tx1"/>
-              </a:solidFill>
-              <a:latin typeface="+mj-lt"/>
-            </a:endParaRPr>
-          </a:p>
-        </p:txBody>
-      </p:sp>
-      <p:sp>
-        <p:nvSpPr>
-          <p:cNvPr id="26" name="Rectangle 25">
-            <a:extLst>
-              <a:ext uri="{FF2B5EF4-FFF2-40B4-BE49-F238E27FC236}">
-                <a16:creationId xmlns:a16="http://schemas.microsoft.com/office/drawing/2014/main" id="{B416B4FF-3057-A1F9-3A4F-5E20E337EBC2}"/>
-              </a:ext>
-            </a:extLst>
-          </p:cNvPr>
-          <p:cNvSpPr/>
-          <p:nvPr/>
-        </p:nvSpPr>
-        <p:spPr>
-          <a:xfrm>
-            <a:off x="6724250" y="5161877"/>
+            <a:off x="3714692" y="3351563"/>
             <a:ext cx="1136822" cy="432486"/>
           </a:xfrm>
           <a:prstGeom prst="rect">
@@ -4888,7 +4915,7 @@
               <a:rPr lang="en-US" dirty="0">
                 <a:latin typeface="+mj-lt"/>
               </a:rPr>
-              <a:t>CSS</a:t>
+              <a:t>API</a:t>
             </a:r>
             <a:endParaRPr lang="en-MY" dirty="0">
               <a:latin typeface="+mj-lt"/>
@@ -4896,28 +4923,611 @@
           </a:p>
         </p:txBody>
       </p:sp>
+    </p:spTree>
+    <p:extLst>
+      <p:ext uri="{BB962C8B-B14F-4D97-AF65-F5344CB8AC3E}">
+        <p14:creationId xmlns:p14="http://schemas.microsoft.com/office/powerpoint/2010/main" val="1251809637"/>
+      </p:ext>
+    </p:extLst>
+  </p:cSld>
+  <p:clrMapOvr>
+    <a:masterClrMapping/>
+  </p:clrMapOvr>
+</p:sld>
+</file>
+
+<file path=ppt/slides/slide2.xml><?xml version="1.0" encoding="utf-8"?>
+<p:sld xmlns:a="http://schemas.openxmlformats.org/drawingml/2006/main" xmlns:r="http://schemas.openxmlformats.org/officeDocument/2006/relationships" xmlns:p="http://schemas.openxmlformats.org/presentationml/2006/main">
+  <p:cSld>
+    <p:spTree>
+      <p:nvGrpSpPr>
+        <p:cNvPr id="1" name=""/>
+        <p:cNvGrpSpPr/>
+        <p:nvPr/>
+      </p:nvGrpSpPr>
+      <p:grpSpPr>
+        <a:xfrm>
+          <a:off x="0" y="0"/>
+          <a:ext cx="0" cy="0"/>
+          <a:chOff x="0" y="0"/>
+          <a:chExt cx="0" cy="0"/>
+        </a:xfrm>
+      </p:grpSpPr>
+      <p:sp>
+        <p:nvSpPr>
+          <p:cNvPr id="11" name="Rectangle 10">
+            <a:extLst>
+              <a:ext uri="{FF2B5EF4-FFF2-40B4-BE49-F238E27FC236}">
+                <a16:creationId xmlns:a16="http://schemas.microsoft.com/office/drawing/2014/main" id="{E7BBA668-970D-A275-46CD-B73ED8782BB9}"/>
+              </a:ext>
+            </a:extLst>
+          </p:cNvPr>
+          <p:cNvSpPr/>
+          <p:nvPr/>
+        </p:nvSpPr>
+        <p:spPr>
+          <a:xfrm>
+            <a:off x="2002971" y="805543"/>
+            <a:ext cx="7478486" cy="2079169"/>
+          </a:xfrm>
+          <a:prstGeom prst="rect">
+            <a:avLst/>
+          </a:prstGeom>
+        </p:spPr>
+        <p:style>
+          <a:lnRef idx="2">
+            <a:schemeClr val="accent6"/>
+          </a:lnRef>
+          <a:fillRef idx="1">
+            <a:schemeClr val="lt1"/>
+          </a:fillRef>
+          <a:effectRef idx="0">
+            <a:schemeClr val="accent6"/>
+          </a:effectRef>
+          <a:fontRef idx="minor">
+            <a:schemeClr val="dk1"/>
+          </a:fontRef>
+        </p:style>
+        <p:txBody>
+          <a:bodyPr rtlCol="0" anchor="ctr"/>
+          <a:lstStyle/>
+          <a:p>
+            <a:pPr algn="ctr"/>
+            <a:endParaRPr lang="en-MY" dirty="0"/>
+          </a:p>
+        </p:txBody>
+      </p:sp>
+      <p:sp>
+        <p:nvSpPr>
+          <p:cNvPr id="4" name="Rectangle 3">
+            <a:extLst>
+              <a:ext uri="{FF2B5EF4-FFF2-40B4-BE49-F238E27FC236}">
+                <a16:creationId xmlns:a16="http://schemas.microsoft.com/office/drawing/2014/main" id="{57893C18-91D9-C80B-D2C7-18C6C4AE2128}"/>
+              </a:ext>
+            </a:extLst>
+          </p:cNvPr>
+          <p:cNvSpPr/>
+          <p:nvPr/>
+        </p:nvSpPr>
+        <p:spPr>
+          <a:xfrm>
+            <a:off x="615043" y="1654626"/>
+            <a:ext cx="968829" cy="620486"/>
+          </a:xfrm>
+          <a:prstGeom prst="rect">
+            <a:avLst/>
+          </a:prstGeom>
+        </p:spPr>
+        <p:style>
+          <a:lnRef idx="2">
+            <a:schemeClr val="accent6"/>
+          </a:lnRef>
+          <a:fillRef idx="1">
+            <a:schemeClr val="lt1"/>
+          </a:fillRef>
+          <a:effectRef idx="0">
+            <a:schemeClr val="accent6"/>
+          </a:effectRef>
+          <a:fontRef idx="minor">
+            <a:schemeClr val="dk1"/>
+          </a:fontRef>
+        </p:style>
+        <p:txBody>
+          <a:bodyPr rtlCol="0" anchor="ctr"/>
+          <a:lstStyle/>
+          <a:p>
+            <a:pPr algn="ctr"/>
+            <a:r>
+              <a:rPr lang="en-MY" dirty="0"/>
+              <a:t>DWS</a:t>
+            </a:r>
+          </a:p>
+        </p:txBody>
+      </p:sp>
+      <p:sp>
+        <p:nvSpPr>
+          <p:cNvPr id="5" name="Rectangle 4">
+            <a:extLst>
+              <a:ext uri="{FF2B5EF4-FFF2-40B4-BE49-F238E27FC236}">
+                <a16:creationId xmlns:a16="http://schemas.microsoft.com/office/drawing/2014/main" id="{6874E4CB-6612-5B8B-13C8-15FAE0D68821}"/>
+              </a:ext>
+            </a:extLst>
+          </p:cNvPr>
+          <p:cNvSpPr/>
+          <p:nvPr/>
+        </p:nvSpPr>
+        <p:spPr>
+          <a:xfrm>
+            <a:off x="674913" y="3124201"/>
+            <a:ext cx="968829" cy="620486"/>
+          </a:xfrm>
+          <a:prstGeom prst="rect">
+            <a:avLst/>
+          </a:prstGeom>
+        </p:spPr>
+        <p:style>
+          <a:lnRef idx="2">
+            <a:schemeClr val="accent6"/>
+          </a:lnRef>
+          <a:fillRef idx="1">
+            <a:schemeClr val="lt1"/>
+          </a:fillRef>
+          <a:effectRef idx="0">
+            <a:schemeClr val="accent6"/>
+          </a:effectRef>
+          <a:fontRef idx="minor">
+            <a:schemeClr val="dk1"/>
+          </a:fontRef>
+        </p:style>
+        <p:txBody>
+          <a:bodyPr rtlCol="0" anchor="ctr"/>
+          <a:lstStyle/>
+          <a:p>
+            <a:pPr algn="ctr"/>
+            <a:r>
+              <a:rPr lang="en-MY" dirty="0"/>
+              <a:t>CSS</a:t>
+            </a:r>
+          </a:p>
+        </p:txBody>
+      </p:sp>
+      <p:sp>
+        <p:nvSpPr>
+          <p:cNvPr id="6" name="Rectangle 5">
+            <a:extLst>
+              <a:ext uri="{FF2B5EF4-FFF2-40B4-BE49-F238E27FC236}">
+                <a16:creationId xmlns:a16="http://schemas.microsoft.com/office/drawing/2014/main" id="{2B89FB24-C0EF-8BB3-4D15-0B0F60802E66}"/>
+              </a:ext>
+            </a:extLst>
+          </p:cNvPr>
+          <p:cNvSpPr/>
+          <p:nvPr/>
+        </p:nvSpPr>
+        <p:spPr>
+          <a:xfrm>
+            <a:off x="2351315" y="1368878"/>
+            <a:ext cx="1219200" cy="1191985"/>
+          </a:xfrm>
+          <a:prstGeom prst="rect">
+            <a:avLst/>
+          </a:prstGeom>
+        </p:spPr>
+        <p:style>
+          <a:lnRef idx="2">
+            <a:schemeClr val="accent6"/>
+          </a:lnRef>
+          <a:fillRef idx="1">
+            <a:schemeClr val="lt1"/>
+          </a:fillRef>
+          <a:effectRef idx="0">
+            <a:schemeClr val="accent6"/>
+          </a:effectRef>
+          <a:fontRef idx="minor">
+            <a:schemeClr val="dk1"/>
+          </a:fontRef>
+        </p:style>
+        <p:txBody>
+          <a:bodyPr rtlCol="0" anchor="ctr"/>
+          <a:lstStyle/>
+          <a:p>
+            <a:pPr algn="ctr"/>
+            <a:r>
+              <a:rPr lang="en-MY" dirty="0"/>
+              <a:t>Drizzle ORM</a:t>
+            </a:r>
+          </a:p>
+        </p:txBody>
+      </p:sp>
+      <p:sp>
+        <p:nvSpPr>
+          <p:cNvPr id="7" name="Rectangle 6">
+            <a:extLst>
+              <a:ext uri="{FF2B5EF4-FFF2-40B4-BE49-F238E27FC236}">
+                <a16:creationId xmlns:a16="http://schemas.microsoft.com/office/drawing/2014/main" id="{E30EF2D9-2FC7-4410-0BD3-037F037C8781}"/>
+              </a:ext>
+            </a:extLst>
+          </p:cNvPr>
+          <p:cNvSpPr/>
+          <p:nvPr/>
+        </p:nvSpPr>
+        <p:spPr>
+          <a:xfrm>
+            <a:off x="4180114" y="1368878"/>
+            <a:ext cx="1219200" cy="1191985"/>
+          </a:xfrm>
+          <a:prstGeom prst="rect">
+            <a:avLst/>
+          </a:prstGeom>
+        </p:spPr>
+        <p:style>
+          <a:lnRef idx="2">
+            <a:schemeClr val="accent6"/>
+          </a:lnRef>
+          <a:fillRef idx="1">
+            <a:schemeClr val="lt1"/>
+          </a:fillRef>
+          <a:effectRef idx="0">
+            <a:schemeClr val="accent6"/>
+          </a:effectRef>
+          <a:fontRef idx="minor">
+            <a:schemeClr val="dk1"/>
+          </a:fontRef>
+        </p:style>
+        <p:txBody>
+          <a:bodyPr rtlCol="0" anchor="ctr"/>
+          <a:lstStyle/>
+          <a:p>
+            <a:pPr algn="ctr"/>
+            <a:r>
+              <a:rPr lang="en-MY" dirty="0" err="1"/>
+              <a:t>NextJS</a:t>
+            </a:r>
+            <a:endParaRPr lang="en-MY" dirty="0"/>
+          </a:p>
+        </p:txBody>
+      </p:sp>
+      <p:sp>
+        <p:nvSpPr>
+          <p:cNvPr id="8" name="Rectangle 7">
+            <a:extLst>
+              <a:ext uri="{FF2B5EF4-FFF2-40B4-BE49-F238E27FC236}">
+                <a16:creationId xmlns:a16="http://schemas.microsoft.com/office/drawing/2014/main" id="{745873D6-E7A4-E7FA-4D74-21950E6759A7}"/>
+              </a:ext>
+            </a:extLst>
+          </p:cNvPr>
+          <p:cNvSpPr/>
+          <p:nvPr/>
+        </p:nvSpPr>
+        <p:spPr>
+          <a:xfrm>
+            <a:off x="5856514" y="1368878"/>
+            <a:ext cx="1219200" cy="1191985"/>
+          </a:xfrm>
+          <a:prstGeom prst="rect">
+            <a:avLst/>
+          </a:prstGeom>
+        </p:spPr>
+        <p:style>
+          <a:lnRef idx="2">
+            <a:schemeClr val="accent6"/>
+          </a:lnRef>
+          <a:fillRef idx="1">
+            <a:schemeClr val="lt1"/>
+          </a:fillRef>
+          <a:effectRef idx="0">
+            <a:schemeClr val="accent6"/>
+          </a:effectRef>
+          <a:fontRef idx="minor">
+            <a:schemeClr val="dk1"/>
+          </a:fontRef>
+        </p:style>
+        <p:txBody>
+          <a:bodyPr rtlCol="0" anchor="ctr"/>
+          <a:lstStyle/>
+          <a:p>
+            <a:pPr algn="ctr"/>
+            <a:r>
+              <a:rPr lang="en-MY" dirty="0"/>
+              <a:t>Better Auth</a:t>
+            </a:r>
+          </a:p>
+        </p:txBody>
+      </p:sp>
+      <p:sp>
+        <p:nvSpPr>
+          <p:cNvPr id="9" name="Rectangle 8">
+            <a:extLst>
+              <a:ext uri="{FF2B5EF4-FFF2-40B4-BE49-F238E27FC236}">
+                <a16:creationId xmlns:a16="http://schemas.microsoft.com/office/drawing/2014/main" id="{8D4A5376-C72F-7EE4-AD9B-40821879C248}"/>
+              </a:ext>
+            </a:extLst>
+          </p:cNvPr>
+          <p:cNvSpPr/>
+          <p:nvPr/>
+        </p:nvSpPr>
+        <p:spPr>
+          <a:xfrm>
+            <a:off x="4180114" y="3116039"/>
+            <a:ext cx="1219200" cy="628648"/>
+          </a:xfrm>
+          <a:prstGeom prst="rect">
+            <a:avLst/>
+          </a:prstGeom>
+        </p:spPr>
+        <p:style>
+          <a:lnRef idx="2">
+            <a:schemeClr val="accent6"/>
+          </a:lnRef>
+          <a:fillRef idx="1">
+            <a:schemeClr val="lt1"/>
+          </a:fillRef>
+          <a:effectRef idx="0">
+            <a:schemeClr val="accent6"/>
+          </a:effectRef>
+          <a:fontRef idx="minor">
+            <a:schemeClr val="dk1"/>
+          </a:fontRef>
+        </p:style>
+        <p:txBody>
+          <a:bodyPr rtlCol="0" anchor="ctr"/>
+          <a:lstStyle/>
+          <a:p>
+            <a:pPr algn="ctr"/>
+            <a:r>
+              <a:rPr lang="en-MY" dirty="0"/>
+              <a:t>Azure OpenAI</a:t>
+            </a:r>
+          </a:p>
+        </p:txBody>
+      </p:sp>
+      <p:sp>
+        <p:nvSpPr>
+          <p:cNvPr id="10" name="Rectangle 9">
+            <a:extLst>
+              <a:ext uri="{FF2B5EF4-FFF2-40B4-BE49-F238E27FC236}">
+                <a16:creationId xmlns:a16="http://schemas.microsoft.com/office/drawing/2014/main" id="{9585C9F7-769C-22EC-4D8C-18E4A7067610}"/>
+              </a:ext>
+            </a:extLst>
+          </p:cNvPr>
+          <p:cNvSpPr/>
+          <p:nvPr/>
+        </p:nvSpPr>
+        <p:spPr>
+          <a:xfrm>
+            <a:off x="7641771" y="1368877"/>
+            <a:ext cx="1219200" cy="1191985"/>
+          </a:xfrm>
+          <a:prstGeom prst="rect">
+            <a:avLst/>
+          </a:prstGeom>
+        </p:spPr>
+        <p:style>
+          <a:lnRef idx="2">
+            <a:schemeClr val="accent6"/>
+          </a:lnRef>
+          <a:fillRef idx="1">
+            <a:schemeClr val="lt1"/>
+          </a:fillRef>
+          <a:effectRef idx="0">
+            <a:schemeClr val="accent6"/>
+          </a:effectRef>
+          <a:fontRef idx="minor">
+            <a:schemeClr val="dk1"/>
+          </a:fontRef>
+        </p:style>
+        <p:txBody>
+          <a:bodyPr rtlCol="0" anchor="ctr"/>
+          <a:lstStyle/>
+          <a:p>
+            <a:pPr algn="ctr"/>
+            <a:r>
+              <a:rPr lang="en-MY" dirty="0"/>
+              <a:t>IAM</a:t>
+            </a:r>
+          </a:p>
+        </p:txBody>
+      </p:sp>
+      <p:sp>
+        <p:nvSpPr>
+          <p:cNvPr id="12" name="TextBox 11">
+            <a:extLst>
+              <a:ext uri="{FF2B5EF4-FFF2-40B4-BE49-F238E27FC236}">
+                <a16:creationId xmlns:a16="http://schemas.microsoft.com/office/drawing/2014/main" id="{B4D239F5-8B82-D85C-DEB1-494248FF4369}"/>
+              </a:ext>
+            </a:extLst>
+          </p:cNvPr>
+          <p:cNvSpPr txBox="1"/>
+          <p:nvPr/>
+        </p:nvSpPr>
+        <p:spPr>
+          <a:xfrm>
+            <a:off x="2623321" y="999545"/>
+            <a:ext cx="675185" cy="369332"/>
+          </a:xfrm>
+          <a:prstGeom prst="rect">
+            <a:avLst/>
+          </a:prstGeom>
+          <a:noFill/>
+        </p:spPr>
+        <p:txBody>
+          <a:bodyPr wrap="none" rtlCol="0">
+            <a:spAutoFit/>
+          </a:bodyPr>
+          <a:lstStyle/>
+          <a:p>
+            <a:r>
+              <a:rPr lang="en-MY" dirty="0"/>
+              <a:t>ORM</a:t>
+            </a:r>
+          </a:p>
+        </p:txBody>
+      </p:sp>
+      <p:sp>
+        <p:nvSpPr>
+          <p:cNvPr id="13" name="TextBox 12">
+            <a:extLst>
+              <a:ext uri="{FF2B5EF4-FFF2-40B4-BE49-F238E27FC236}">
+                <a16:creationId xmlns:a16="http://schemas.microsoft.com/office/drawing/2014/main" id="{F3DDF08E-9595-30F7-4EBD-B5DBC9171653}"/>
+              </a:ext>
+            </a:extLst>
+          </p:cNvPr>
+          <p:cNvSpPr txBox="1"/>
+          <p:nvPr/>
+        </p:nvSpPr>
+        <p:spPr>
+          <a:xfrm>
+            <a:off x="4452121" y="925677"/>
+            <a:ext cx="580608" cy="369332"/>
+          </a:xfrm>
+          <a:prstGeom prst="rect">
+            <a:avLst/>
+          </a:prstGeom>
+          <a:noFill/>
+        </p:spPr>
+        <p:txBody>
+          <a:bodyPr wrap="none" rtlCol="0">
+            <a:spAutoFit/>
+          </a:bodyPr>
+          <a:lstStyle/>
+          <a:p>
+            <a:r>
+              <a:rPr lang="en-MY" dirty="0"/>
+              <a:t>App</a:t>
+            </a:r>
+          </a:p>
+        </p:txBody>
+      </p:sp>
+      <p:sp>
+        <p:nvSpPr>
+          <p:cNvPr id="14" name="TextBox 13">
+            <a:extLst>
+              <a:ext uri="{FF2B5EF4-FFF2-40B4-BE49-F238E27FC236}">
+                <a16:creationId xmlns:a16="http://schemas.microsoft.com/office/drawing/2014/main" id="{BE7EF78E-92D1-3E41-D53E-145023C79038}"/>
+              </a:ext>
+            </a:extLst>
+          </p:cNvPr>
+          <p:cNvSpPr txBox="1"/>
+          <p:nvPr/>
+        </p:nvSpPr>
+        <p:spPr>
+          <a:xfrm>
+            <a:off x="5638900" y="925677"/>
+            <a:ext cx="1513556" cy="369332"/>
+          </a:xfrm>
+          <a:prstGeom prst="rect">
+            <a:avLst/>
+          </a:prstGeom>
+          <a:noFill/>
+        </p:spPr>
+        <p:txBody>
+          <a:bodyPr wrap="none" rtlCol="0">
+            <a:spAutoFit/>
+          </a:bodyPr>
+          <a:lstStyle/>
+          <a:p>
+            <a:r>
+              <a:rPr lang="en-MY" dirty="0"/>
+              <a:t>Authorization</a:t>
+            </a:r>
+          </a:p>
+        </p:txBody>
+      </p:sp>
+      <p:sp>
+        <p:nvSpPr>
+          <p:cNvPr id="15" name="TextBox 14">
+            <a:extLst>
+              <a:ext uri="{FF2B5EF4-FFF2-40B4-BE49-F238E27FC236}">
+                <a16:creationId xmlns:a16="http://schemas.microsoft.com/office/drawing/2014/main" id="{E4A9CD5D-CFDB-D200-54E7-E9C983388AA5}"/>
+              </a:ext>
+            </a:extLst>
+          </p:cNvPr>
+          <p:cNvSpPr txBox="1"/>
+          <p:nvPr/>
+        </p:nvSpPr>
+        <p:spPr>
+          <a:xfrm>
+            <a:off x="7424157" y="902544"/>
+            <a:ext cx="1654427" cy="369332"/>
+          </a:xfrm>
+          <a:prstGeom prst="rect">
+            <a:avLst/>
+          </a:prstGeom>
+          <a:noFill/>
+        </p:spPr>
+        <p:txBody>
+          <a:bodyPr wrap="none" rtlCol="0">
+            <a:spAutoFit/>
+          </a:bodyPr>
+          <a:lstStyle/>
+          <a:p>
+            <a:r>
+              <a:rPr lang="en-MY" dirty="0"/>
+              <a:t>Authentication</a:t>
+            </a:r>
+          </a:p>
+        </p:txBody>
+      </p:sp>
+      <p:sp>
+        <p:nvSpPr>
+          <p:cNvPr id="16" name="TextBox 15">
+            <a:extLst>
+              <a:ext uri="{FF2B5EF4-FFF2-40B4-BE49-F238E27FC236}">
+                <a16:creationId xmlns:a16="http://schemas.microsoft.com/office/drawing/2014/main" id="{3D5D6B0C-5A5B-DDA4-10A2-52780622033F}"/>
+              </a:ext>
+            </a:extLst>
+          </p:cNvPr>
+          <p:cNvSpPr txBox="1"/>
+          <p:nvPr/>
+        </p:nvSpPr>
+        <p:spPr>
+          <a:xfrm>
+            <a:off x="4443304" y="3791348"/>
+            <a:ext cx="598241" cy="369332"/>
+          </a:xfrm>
+          <a:prstGeom prst="rect">
+            <a:avLst/>
+          </a:prstGeom>
+          <a:noFill/>
+        </p:spPr>
+        <p:txBody>
+          <a:bodyPr wrap="none" rtlCol="0">
+            <a:spAutoFit/>
+          </a:bodyPr>
+          <a:lstStyle/>
+          <a:p>
+            <a:r>
+              <a:rPr lang="en-MY" dirty="0"/>
+              <a:t>LLM</a:t>
+            </a:r>
+          </a:p>
+        </p:txBody>
+      </p:sp>
       <p:cxnSp>
         <p:nvCxnSpPr>
-          <p:cNvPr id="33" name="Straight Connector 32">
-            <a:extLst>
-              <a:ext uri="{FF2B5EF4-FFF2-40B4-BE49-F238E27FC236}">
-                <a16:creationId xmlns:a16="http://schemas.microsoft.com/office/drawing/2014/main" id="{7B35168D-580A-8049-CC9A-FEE2F5D2A1AC}"/>
+          <p:cNvPr id="20" name="Straight Arrow Connector 19">
+            <a:extLst>
+              <a:ext uri="{FF2B5EF4-FFF2-40B4-BE49-F238E27FC236}">
+                <a16:creationId xmlns:a16="http://schemas.microsoft.com/office/drawing/2014/main" id="{57C99799-9C00-4441-D975-6D49BCF190CC}"/>
               </a:ext>
             </a:extLst>
           </p:cNvPr>
           <p:cNvCxnSpPr>
-            <a:cxnSpLocks/>
+            <a:stCxn id="4" idx="3"/>
+            <a:endCxn id="6" idx="1"/>
           </p:cNvCxnSpPr>
           <p:nvPr/>
         </p:nvCxnSpPr>
         <p:spPr>
           <a:xfrm>
-            <a:off x="1482280" y="5423250"/>
-            <a:ext cx="642439" cy="0"/>
+            <a:off x="1583872" y="1964869"/>
+            <a:ext cx="767443" cy="2"/>
           </a:xfrm>
-          <a:prstGeom prst="line">
+          <a:prstGeom prst="straightConnector1">
             <a:avLst/>
           </a:prstGeom>
+          <a:ln>
+            <a:tailEnd type="triangle"/>
+          </a:ln>
         </p:spPr>
         <p:style>
           <a:lnRef idx="2">
@@ -4936,27 +5546,30 @@
       </p:cxnSp>
       <p:cxnSp>
         <p:nvCxnSpPr>
-          <p:cNvPr id="36" name="Straight Connector 35">
-            <a:extLst>
-              <a:ext uri="{FF2B5EF4-FFF2-40B4-BE49-F238E27FC236}">
-                <a16:creationId xmlns:a16="http://schemas.microsoft.com/office/drawing/2014/main" id="{0CD3B14F-6F3A-EE6B-C6DB-3A44CEF4018B}"/>
+          <p:cNvPr id="21" name="Straight Arrow Connector 20">
+            <a:extLst>
+              <a:ext uri="{FF2B5EF4-FFF2-40B4-BE49-F238E27FC236}">
+                <a16:creationId xmlns:a16="http://schemas.microsoft.com/office/drawing/2014/main" id="{90E48BA8-8C11-863C-C1C2-A7575992E9E6}"/>
               </a:ext>
             </a:extLst>
           </p:cNvPr>
           <p:cNvCxnSpPr>
             <a:cxnSpLocks/>
-            <a:endCxn id="20" idx="1"/>
+            <a:endCxn id="9" idx="1"/>
           </p:cNvCxnSpPr>
           <p:nvPr/>
         </p:nvCxnSpPr>
         <p:spPr>
-          <a:xfrm flipV="1">
-            <a:off x="3261541" y="5403507"/>
-            <a:ext cx="370702" cy="8079"/>
+          <a:xfrm>
+            <a:off x="1619249" y="3429000"/>
+            <a:ext cx="2560865" cy="1363"/>
           </a:xfrm>
-          <a:prstGeom prst="line">
+          <a:prstGeom prst="straightConnector1">
             <a:avLst/>
           </a:prstGeom>
+          <a:ln>
+            <a:tailEnd type="triangle"/>
+          </a:ln>
         </p:spPr>
         <p:style>
           <a:lnRef idx="2">
@@ -4973,29 +5586,67 @@
           </a:fontRef>
         </p:style>
       </p:cxnSp>
+      <p:sp>
+        <p:nvSpPr>
+          <p:cNvPr id="22" name="TextBox 21">
+            <a:extLst>
+              <a:ext uri="{FF2B5EF4-FFF2-40B4-BE49-F238E27FC236}">
+                <a16:creationId xmlns:a16="http://schemas.microsoft.com/office/drawing/2014/main" id="{4CE80047-8DE4-0161-3C04-2ED94947EAA9}"/>
+              </a:ext>
+            </a:extLst>
+          </p:cNvPr>
+          <p:cNvSpPr txBox="1"/>
+          <p:nvPr/>
+        </p:nvSpPr>
+        <p:spPr>
+          <a:xfrm>
+            <a:off x="8860971" y="436211"/>
+            <a:ext cx="632353" cy="369332"/>
+          </a:xfrm>
+          <a:prstGeom prst="rect">
+            <a:avLst/>
+          </a:prstGeom>
+          <a:noFill/>
+        </p:spPr>
+        <p:txBody>
+          <a:bodyPr wrap="none" rtlCol="0">
+            <a:spAutoFit/>
+          </a:bodyPr>
+          <a:lstStyle/>
+          <a:p>
+            <a:r>
+              <a:rPr lang="en-MY" dirty="0"/>
+              <a:t>CCE</a:t>
+            </a:r>
+          </a:p>
+        </p:txBody>
+      </p:sp>
       <p:cxnSp>
         <p:nvCxnSpPr>
-          <p:cNvPr id="40" name="Straight Connector 39">
-            <a:extLst>
-              <a:ext uri="{FF2B5EF4-FFF2-40B4-BE49-F238E27FC236}">
-                <a16:creationId xmlns:a16="http://schemas.microsoft.com/office/drawing/2014/main" id="{B8E75BB3-E836-09EF-ADEC-BA5DEFAB8CBF}"/>
+          <p:cNvPr id="24" name="Straight Arrow Connector 23">
+            <a:extLst>
+              <a:ext uri="{FF2B5EF4-FFF2-40B4-BE49-F238E27FC236}">
+                <a16:creationId xmlns:a16="http://schemas.microsoft.com/office/drawing/2014/main" id="{BCFD8DA5-3601-4598-3BC4-CD2A6CDFF2FC}"/>
               </a:ext>
             </a:extLst>
           </p:cNvPr>
           <p:cNvCxnSpPr>
             <a:cxnSpLocks/>
-            <a:stCxn id="20" idx="3"/>
+            <a:stCxn id="9" idx="0"/>
           </p:cNvCxnSpPr>
           <p:nvPr/>
         </p:nvCxnSpPr>
         <p:spPr>
-          <a:xfrm>
-            <a:off x="4769065" y="5403507"/>
-            <a:ext cx="611127" cy="0"/>
+          <a:xfrm flipV="1">
+            <a:off x="4789714" y="2560862"/>
+            <a:ext cx="0" cy="555177"/>
           </a:xfrm>
-          <a:prstGeom prst="line">
+          <a:prstGeom prst="straightConnector1">
             <a:avLst/>
           </a:prstGeom>
+          <a:ln>
+            <a:tailEnd type="triangle"/>
+          </a:ln>
         </p:spPr>
         <p:style>
           <a:lnRef idx="2">
@@ -5012,304 +5663,150 @@
           </a:fontRef>
         </p:style>
       </p:cxnSp>
+      <p:sp>
+        <p:nvSpPr>
+          <p:cNvPr id="27" name="TextBox 26">
+            <a:extLst>
+              <a:ext uri="{FF2B5EF4-FFF2-40B4-BE49-F238E27FC236}">
+                <a16:creationId xmlns:a16="http://schemas.microsoft.com/office/drawing/2014/main" id="{80AAE55C-03CD-79DB-67AC-1DC3D91742DF}"/>
+              </a:ext>
+            </a:extLst>
+          </p:cNvPr>
+          <p:cNvSpPr txBox="1"/>
+          <p:nvPr/>
+        </p:nvSpPr>
+        <p:spPr>
+          <a:xfrm>
+            <a:off x="9601300" y="1595537"/>
+            <a:ext cx="652486" cy="369332"/>
+          </a:xfrm>
+          <a:prstGeom prst="rect">
+            <a:avLst/>
+          </a:prstGeom>
+          <a:noFill/>
+        </p:spPr>
+        <p:txBody>
+          <a:bodyPr wrap="none" rtlCol="0">
+            <a:spAutoFit/>
+          </a:bodyPr>
+          <a:lstStyle/>
+          <a:p>
+            <a:r>
+              <a:rPr lang="en-MY" dirty="0"/>
+              <a:t>User</a:t>
+            </a:r>
+          </a:p>
+        </p:txBody>
+      </p:sp>
+      <p:sp>
+        <p:nvSpPr>
+          <p:cNvPr id="28" name="Rectangle 27">
+            <a:extLst>
+              <a:ext uri="{FF2B5EF4-FFF2-40B4-BE49-F238E27FC236}">
+                <a16:creationId xmlns:a16="http://schemas.microsoft.com/office/drawing/2014/main" id="{EFBEA0D4-69DB-15E0-A792-A7993727FC45}"/>
+              </a:ext>
+            </a:extLst>
+          </p:cNvPr>
+          <p:cNvSpPr/>
+          <p:nvPr/>
+        </p:nvSpPr>
+        <p:spPr>
+          <a:xfrm>
+            <a:off x="5856513" y="3004846"/>
+            <a:ext cx="1219200" cy="786502"/>
+          </a:xfrm>
+          <a:prstGeom prst="rect">
+            <a:avLst/>
+          </a:prstGeom>
+        </p:spPr>
+        <p:style>
+          <a:lnRef idx="2">
+            <a:schemeClr val="accent6"/>
+          </a:lnRef>
+          <a:fillRef idx="1">
+            <a:schemeClr val="lt1"/>
+          </a:fillRef>
+          <a:effectRef idx="0">
+            <a:schemeClr val="accent6"/>
+          </a:effectRef>
+          <a:fontRef idx="minor">
+            <a:schemeClr val="dk1"/>
+          </a:fontRef>
+        </p:style>
+        <p:txBody>
+          <a:bodyPr rtlCol="0" anchor="ctr"/>
+          <a:lstStyle/>
+          <a:p>
+            <a:pPr algn="ctr"/>
+            <a:r>
+              <a:rPr lang="en-MY" dirty="0"/>
+              <a:t>Self-Hosted</a:t>
+            </a:r>
+          </a:p>
+          <a:p>
+            <a:pPr algn="ctr"/>
+            <a:r>
+              <a:rPr lang="en-MY" dirty="0"/>
+              <a:t>LLM</a:t>
+            </a:r>
+          </a:p>
+        </p:txBody>
+      </p:sp>
+      <p:sp>
+        <p:nvSpPr>
+          <p:cNvPr id="29" name="TextBox 28">
+            <a:extLst>
+              <a:ext uri="{FF2B5EF4-FFF2-40B4-BE49-F238E27FC236}">
+                <a16:creationId xmlns:a16="http://schemas.microsoft.com/office/drawing/2014/main" id="{D4514361-4D7D-0977-17DE-691CEA5F731A}"/>
+              </a:ext>
+            </a:extLst>
+          </p:cNvPr>
+          <p:cNvSpPr txBox="1"/>
+          <p:nvPr/>
+        </p:nvSpPr>
+        <p:spPr>
+          <a:xfrm>
+            <a:off x="6166992" y="3791348"/>
+            <a:ext cx="638316" cy="369332"/>
+          </a:xfrm>
+          <a:prstGeom prst="rect">
+            <a:avLst/>
+          </a:prstGeom>
+          <a:noFill/>
+        </p:spPr>
+        <p:txBody>
+          <a:bodyPr wrap="none" rtlCol="0">
+            <a:spAutoFit/>
+          </a:bodyPr>
+          <a:lstStyle/>
+          <a:p>
+            <a:r>
+              <a:rPr lang="en-MY" dirty="0"/>
+              <a:t>GPU</a:t>
+            </a:r>
+          </a:p>
+        </p:txBody>
+      </p:sp>
       <p:cxnSp>
         <p:nvCxnSpPr>
-          <p:cNvPr id="43" name="Straight Connector 42">
-            <a:extLst>
-              <a:ext uri="{FF2B5EF4-FFF2-40B4-BE49-F238E27FC236}">
-                <a16:creationId xmlns:a16="http://schemas.microsoft.com/office/drawing/2014/main" id="{4F842574-3B61-818C-2871-5533B1F9AF32}"/>
+          <p:cNvPr id="31" name="Straight Connector 30">
+            <a:extLst>
+              <a:ext uri="{FF2B5EF4-FFF2-40B4-BE49-F238E27FC236}">
+                <a16:creationId xmlns:a16="http://schemas.microsoft.com/office/drawing/2014/main" id="{3376FA9A-1033-6CBD-C48F-6E7A227CE573}"/>
               </a:ext>
             </a:extLst>
           </p:cNvPr>
           <p:cNvCxnSpPr>
             <a:cxnSpLocks/>
-            <a:stCxn id="5" idx="2"/>
-            <a:endCxn id="22" idx="0"/>
           </p:cNvCxnSpPr>
           <p:nvPr/>
         </p:nvCxnSpPr>
         <p:spPr>
           <a:xfrm>
-            <a:off x="5989131" y="5594363"/>
-            <a:ext cx="0" cy="168002"/>
+            <a:off x="5456463" y="3201761"/>
+            <a:ext cx="342900" cy="542926"/>
           </a:xfrm>
           <a:prstGeom prst="line">
-            <a:avLst/>
-          </a:prstGeom>
-        </p:spPr>
-        <p:style>
-          <a:lnRef idx="2">
-            <a:schemeClr val="dk1"/>
-          </a:lnRef>
-          <a:fillRef idx="0">
-            <a:schemeClr val="dk1"/>
-          </a:fillRef>
-          <a:effectRef idx="1">
-            <a:schemeClr val="dk1"/>
-          </a:effectRef>
-          <a:fontRef idx="minor">
-            <a:schemeClr val="tx1"/>
-          </a:fontRef>
-        </p:style>
-      </p:cxnSp>
-      <p:cxnSp>
-        <p:nvCxnSpPr>
-          <p:cNvPr id="3" name="Straight Connector 2">
-            <a:extLst>
-              <a:ext uri="{FF2B5EF4-FFF2-40B4-BE49-F238E27FC236}">
-                <a16:creationId xmlns:a16="http://schemas.microsoft.com/office/drawing/2014/main" id="{EF22CB21-0E09-2D83-F4A8-0DA2AA1BB5AE}"/>
-              </a:ext>
-            </a:extLst>
-          </p:cNvPr>
-          <p:cNvCxnSpPr>
-            <a:stCxn id="5" idx="3"/>
-            <a:endCxn id="26" idx="1"/>
-          </p:cNvCxnSpPr>
-          <p:nvPr/>
-        </p:nvCxnSpPr>
-        <p:spPr>
-          <a:xfrm>
-            <a:off x="6557542" y="5378120"/>
-            <a:ext cx="166708" cy="0"/>
-          </a:xfrm>
-          <a:prstGeom prst="line">
-            <a:avLst/>
-          </a:prstGeom>
-        </p:spPr>
-        <p:style>
-          <a:lnRef idx="2">
-            <a:schemeClr val="dk1"/>
-          </a:lnRef>
-          <a:fillRef idx="0">
-            <a:schemeClr val="dk1"/>
-          </a:fillRef>
-          <a:effectRef idx="1">
-            <a:schemeClr val="dk1"/>
-          </a:effectRef>
-          <a:fontRef idx="minor">
-            <a:schemeClr val="tx1"/>
-          </a:fontRef>
-        </p:style>
-      </p:cxnSp>
-      <p:cxnSp>
-        <p:nvCxnSpPr>
-          <p:cNvPr id="18" name="Straight Connector 17">
-            <a:extLst>
-              <a:ext uri="{FF2B5EF4-FFF2-40B4-BE49-F238E27FC236}">
-                <a16:creationId xmlns:a16="http://schemas.microsoft.com/office/drawing/2014/main" id="{7F49D5D4-166D-BCC3-8B97-9AB0A940004C}"/>
-              </a:ext>
-            </a:extLst>
-          </p:cNvPr>
-          <p:cNvCxnSpPr>
-            <a:stCxn id="26" idx="2"/>
-            <a:endCxn id="23" idx="0"/>
-          </p:cNvCxnSpPr>
-          <p:nvPr/>
-        </p:nvCxnSpPr>
-        <p:spPr>
-          <a:xfrm>
-            <a:off x="7292661" y="5594363"/>
-            <a:ext cx="13191" cy="168002"/>
-          </a:xfrm>
-          <a:prstGeom prst="line">
-            <a:avLst/>
-          </a:prstGeom>
-        </p:spPr>
-        <p:style>
-          <a:lnRef idx="2">
-            <a:schemeClr val="accent1"/>
-          </a:lnRef>
-          <a:fillRef idx="0">
-            <a:schemeClr val="accent1"/>
-          </a:fillRef>
-          <a:effectRef idx="1">
-            <a:schemeClr val="accent1"/>
-          </a:effectRef>
-          <a:fontRef idx="minor">
-            <a:schemeClr val="tx1"/>
-          </a:fontRef>
-        </p:style>
-      </p:cxnSp>
-      <p:cxnSp>
-        <p:nvCxnSpPr>
-          <p:cNvPr id="21" name="Straight Connector 20">
-            <a:extLst>
-              <a:ext uri="{FF2B5EF4-FFF2-40B4-BE49-F238E27FC236}">
-                <a16:creationId xmlns:a16="http://schemas.microsoft.com/office/drawing/2014/main" id="{3C817116-6537-7F05-8F72-0A3F6B354490}"/>
-              </a:ext>
-            </a:extLst>
-          </p:cNvPr>
-          <p:cNvCxnSpPr>
-            <a:stCxn id="22" idx="3"/>
-            <a:endCxn id="23" idx="1"/>
-          </p:cNvCxnSpPr>
-          <p:nvPr/>
-        </p:nvCxnSpPr>
-        <p:spPr>
-          <a:xfrm>
-            <a:off x="6557542" y="5978608"/>
-            <a:ext cx="179899" cy="0"/>
-          </a:xfrm>
-          <a:prstGeom prst="line">
-            <a:avLst/>
-          </a:prstGeom>
-        </p:spPr>
-        <p:style>
-          <a:lnRef idx="2">
-            <a:schemeClr val="dk1"/>
-          </a:lnRef>
-          <a:fillRef idx="0">
-            <a:schemeClr val="dk1"/>
-          </a:fillRef>
-          <a:effectRef idx="1">
-            <a:schemeClr val="dk1"/>
-          </a:effectRef>
-          <a:fontRef idx="minor">
-            <a:schemeClr val="tx1"/>
-          </a:fontRef>
-        </p:style>
-      </p:cxnSp>
-      <p:cxnSp>
-        <p:nvCxnSpPr>
-          <p:cNvPr id="28" name="Connector: Elbow 27">
-            <a:extLst>
-              <a:ext uri="{FF2B5EF4-FFF2-40B4-BE49-F238E27FC236}">
-                <a16:creationId xmlns:a16="http://schemas.microsoft.com/office/drawing/2014/main" id="{C165F66B-FB76-B8D3-0406-DEC2AD3ED9C8}"/>
-              </a:ext>
-            </a:extLst>
-          </p:cNvPr>
-          <p:cNvCxnSpPr>
-            <a:stCxn id="23" idx="3"/>
-            <a:endCxn id="25" idx="2"/>
-          </p:cNvCxnSpPr>
-          <p:nvPr/>
-        </p:nvCxnSpPr>
-        <p:spPr>
-          <a:xfrm flipH="1" flipV="1">
-            <a:off x="3039091" y="3831158"/>
-            <a:ext cx="4835172" cy="2147450"/>
-          </a:xfrm>
-          <a:prstGeom prst="bentConnector4">
-            <a:avLst>
-              <a:gd name="adj1" fmla="val -4728"/>
-              <a:gd name="adj2" fmla="val 55035"/>
-            </a:avLst>
-          </a:prstGeom>
-        </p:spPr>
-        <p:style>
-          <a:lnRef idx="2">
-            <a:schemeClr val="dk1"/>
-          </a:lnRef>
-          <a:fillRef idx="0">
-            <a:schemeClr val="dk1"/>
-          </a:fillRef>
-          <a:effectRef idx="1">
-            <a:schemeClr val="dk1"/>
-          </a:effectRef>
-          <a:fontRef idx="minor">
-            <a:schemeClr val="tx1"/>
-          </a:fontRef>
-        </p:style>
-      </p:cxnSp>
-      <p:cxnSp>
-        <p:nvCxnSpPr>
-          <p:cNvPr id="35" name="Straight Connector 34">
-            <a:extLst>
-              <a:ext uri="{FF2B5EF4-FFF2-40B4-BE49-F238E27FC236}">
-                <a16:creationId xmlns:a16="http://schemas.microsoft.com/office/drawing/2014/main" id="{2B1E4072-53C6-3150-9A94-06DE5847447F}"/>
-              </a:ext>
-            </a:extLst>
-          </p:cNvPr>
-          <p:cNvCxnSpPr>
-            <a:stCxn id="25" idx="3"/>
-            <a:endCxn id="15" idx="1"/>
-          </p:cNvCxnSpPr>
-          <p:nvPr/>
-        </p:nvCxnSpPr>
-        <p:spPr>
-          <a:xfrm>
-            <a:off x="3607502" y="3614915"/>
-            <a:ext cx="359013" cy="9248"/>
-          </a:xfrm>
-          <a:prstGeom prst="line">
-            <a:avLst/>
-          </a:prstGeom>
-        </p:spPr>
-        <p:style>
-          <a:lnRef idx="2">
-            <a:schemeClr val="accent1"/>
-          </a:lnRef>
-          <a:fillRef idx="0">
-            <a:schemeClr val="accent1"/>
-          </a:fillRef>
-          <a:effectRef idx="1">
-            <a:schemeClr val="accent1"/>
-          </a:effectRef>
-          <a:fontRef idx="minor">
-            <a:schemeClr val="tx1"/>
-          </a:fontRef>
-        </p:style>
-      </p:cxnSp>
-      <p:cxnSp>
-        <p:nvCxnSpPr>
-          <p:cNvPr id="45" name="Connector: Elbow 44">
-            <a:extLst>
-              <a:ext uri="{FF2B5EF4-FFF2-40B4-BE49-F238E27FC236}">
-                <a16:creationId xmlns:a16="http://schemas.microsoft.com/office/drawing/2014/main" id="{D05C2B29-FBF1-E87F-3275-0ED2B54B0DC0}"/>
-              </a:ext>
-            </a:extLst>
-          </p:cNvPr>
-          <p:cNvCxnSpPr>
-            <a:stCxn id="22" idx="1"/>
-            <a:endCxn id="15" idx="2"/>
-          </p:cNvCxnSpPr>
-          <p:nvPr/>
-        </p:nvCxnSpPr>
-        <p:spPr>
-          <a:xfrm rot="10800000">
-            <a:off x="4534926" y="3986802"/>
-            <a:ext cx="885794" cy="1991806"/>
-          </a:xfrm>
-          <a:prstGeom prst="bentConnector2">
-            <a:avLst/>
-          </a:prstGeom>
-        </p:spPr>
-        <p:style>
-          <a:lnRef idx="2">
-            <a:schemeClr val="dk1"/>
-          </a:lnRef>
-          <a:fillRef idx="0">
-            <a:schemeClr val="dk1"/>
-          </a:fillRef>
-          <a:effectRef idx="1">
-            <a:schemeClr val="dk1"/>
-          </a:effectRef>
-          <a:fontRef idx="minor">
-            <a:schemeClr val="tx1"/>
-          </a:fontRef>
-        </p:style>
-      </p:cxnSp>
-      <p:cxnSp>
-        <p:nvCxnSpPr>
-          <p:cNvPr id="47" name="Connector: Elbow 46">
-            <a:extLst>
-              <a:ext uri="{FF2B5EF4-FFF2-40B4-BE49-F238E27FC236}">
-                <a16:creationId xmlns:a16="http://schemas.microsoft.com/office/drawing/2014/main" id="{231B006C-BE0C-59FD-C3D4-60F32BE81149}"/>
-              </a:ext>
-            </a:extLst>
-          </p:cNvPr>
-          <p:cNvCxnSpPr>
-            <a:stCxn id="20" idx="0"/>
-            <a:endCxn id="15" idx="2"/>
-          </p:cNvCxnSpPr>
-          <p:nvPr/>
-        </p:nvCxnSpPr>
-        <p:spPr>
-          <a:xfrm rot="5400000" flipH="1" flipV="1">
-            <a:off x="3764785" y="4434351"/>
-            <a:ext cx="1188782" cy="317044"/>
-          </a:xfrm>
-          <a:prstGeom prst="bentConnector3">
             <a:avLst/>
           </a:prstGeom>
         </p:spPr>
@@ -5331,7 +5828,7 @@
     </p:spTree>
     <p:extLst>
       <p:ext uri="{BB962C8B-B14F-4D97-AF65-F5344CB8AC3E}">
-        <p14:creationId xmlns:p14="http://schemas.microsoft.com/office/powerpoint/2010/main" val="3502373294"/>
+        <p14:creationId xmlns:p14="http://schemas.microsoft.com/office/powerpoint/2010/main" val="847988480"/>
       </p:ext>
     </p:extLst>
   </p:cSld>
@@ -5341,7 +5838,7 @@
 </p:sld>
 </file>
 
-<file path=ppt/slides/slide2.xml><?xml version="1.0" encoding="utf-8"?>
+<file path=ppt/slides/slide3.xml><?xml version="1.0" encoding="utf-8"?>
 <p:sld xmlns:a="http://schemas.openxmlformats.org/drawingml/2006/main" xmlns:r="http://schemas.openxmlformats.org/officeDocument/2006/relationships" xmlns:p="http://schemas.openxmlformats.org/presentationml/2006/main">
   <p:cSld>
     <p:spTree>
@@ -6541,7 +7038,7 @@
 </p:sld>
 </file>
 
-<file path=ppt/slides/slide3.xml><?xml version="1.0" encoding="utf-8"?>
+<file path=ppt/slides/slide4.xml><?xml version="1.0" encoding="utf-8"?>
 <p:sld xmlns:a="http://schemas.openxmlformats.org/drawingml/2006/main" xmlns:r="http://schemas.openxmlformats.org/officeDocument/2006/relationships" xmlns:p="http://schemas.openxmlformats.org/presentationml/2006/main">
   <p:cSld>
     <p:spTree>
@@ -7673,7 +8170,7 @@
 </p:sld>
 </file>
 
-<file path=ppt/slides/slide4.xml><?xml version="1.0" encoding="utf-8"?>
+<file path=ppt/slides/slide5.xml><?xml version="1.0" encoding="utf-8"?>
 <p:sld xmlns:a="http://schemas.openxmlformats.org/drawingml/2006/main" xmlns:r="http://schemas.openxmlformats.org/officeDocument/2006/relationships" xmlns:p="http://schemas.openxmlformats.org/presentationml/2006/main">
   <p:cSld>
     <p:spTree>
@@ -8713,7 +9210,7 @@
 </p:sld>
 </file>
 
-<file path=ppt/slides/slide5.xml><?xml version="1.0" encoding="utf-8"?>
+<file path=ppt/slides/slide6.xml><?xml version="1.0" encoding="utf-8"?>
 <p:sld xmlns:a="http://schemas.openxmlformats.org/drawingml/2006/main" xmlns:r="http://schemas.openxmlformats.org/officeDocument/2006/relationships" xmlns:p="http://schemas.openxmlformats.org/presentationml/2006/main">
   <p:cSld>
     <p:spTree>
@@ -9666,7 +10163,7 @@
 </p:sld>
 </file>
 
-<file path=ppt/slides/slide6.xml><?xml version="1.0" encoding="utf-8"?>
+<file path=ppt/slides/slide7.xml><?xml version="1.0" encoding="utf-8"?>
 <p:sld xmlns:a="http://schemas.openxmlformats.org/drawingml/2006/main" xmlns:r="http://schemas.openxmlformats.org/officeDocument/2006/relationships" xmlns:p="http://schemas.openxmlformats.org/presentationml/2006/main">
   <p:cSld>
     <p:spTree>
@@ -10519,7 +11016,7 @@
 </p:sld>
 </file>
 
-<file path=ppt/slides/slide7.xml><?xml version="1.0" encoding="utf-8"?>
+<file path=ppt/slides/slide8.xml><?xml version="1.0" encoding="utf-8"?>
 <p:sld xmlns:a="http://schemas.openxmlformats.org/drawingml/2006/main" xmlns:r="http://schemas.openxmlformats.org/officeDocument/2006/relationships" xmlns:p="http://schemas.openxmlformats.org/presentationml/2006/main">
   <p:cSld>
     <p:bg>
@@ -10742,908 +11239,6 @@
     <p:extLst>
       <p:ext uri="{BB962C8B-B14F-4D97-AF65-F5344CB8AC3E}">
         <p14:creationId xmlns:p14="http://schemas.microsoft.com/office/powerpoint/2010/main" val="825226998"/>
-      </p:ext>
-    </p:extLst>
-  </p:cSld>
-  <p:clrMapOvr>
-    <a:masterClrMapping/>
-  </p:clrMapOvr>
-</p:sld>
-</file>
-
-<file path=ppt/slides/slide8.xml><?xml version="1.0" encoding="utf-8"?>
-<p:sld xmlns:a="http://schemas.openxmlformats.org/drawingml/2006/main" xmlns:r="http://schemas.openxmlformats.org/officeDocument/2006/relationships" xmlns:p="http://schemas.openxmlformats.org/presentationml/2006/main">
-  <p:cSld>
-    <p:spTree>
-      <p:nvGrpSpPr>
-        <p:cNvPr id="1" name=""/>
-        <p:cNvGrpSpPr/>
-        <p:nvPr/>
-      </p:nvGrpSpPr>
-      <p:grpSpPr>
-        <a:xfrm>
-          <a:off x="0" y="0"/>
-          <a:ext cx="0" cy="0"/>
-          <a:chOff x="0" y="0"/>
-          <a:chExt cx="0" cy="0"/>
-        </a:xfrm>
-      </p:grpSpPr>
-      <p:sp>
-        <p:nvSpPr>
-          <p:cNvPr id="11" name="Rectangle 10">
-            <a:extLst>
-              <a:ext uri="{FF2B5EF4-FFF2-40B4-BE49-F238E27FC236}">
-                <a16:creationId xmlns:a16="http://schemas.microsoft.com/office/drawing/2014/main" id="{E7BBA668-970D-A275-46CD-B73ED8782BB9}"/>
-              </a:ext>
-            </a:extLst>
-          </p:cNvPr>
-          <p:cNvSpPr/>
-          <p:nvPr/>
-        </p:nvSpPr>
-        <p:spPr>
-          <a:xfrm>
-            <a:off x="2002971" y="805543"/>
-            <a:ext cx="7478486" cy="2079169"/>
-          </a:xfrm>
-          <a:prstGeom prst="rect">
-            <a:avLst/>
-          </a:prstGeom>
-        </p:spPr>
-        <p:style>
-          <a:lnRef idx="2">
-            <a:schemeClr val="accent6"/>
-          </a:lnRef>
-          <a:fillRef idx="1">
-            <a:schemeClr val="lt1"/>
-          </a:fillRef>
-          <a:effectRef idx="0">
-            <a:schemeClr val="accent6"/>
-          </a:effectRef>
-          <a:fontRef idx="minor">
-            <a:schemeClr val="dk1"/>
-          </a:fontRef>
-        </p:style>
-        <p:txBody>
-          <a:bodyPr rtlCol="0" anchor="ctr"/>
-          <a:lstStyle/>
-          <a:p>
-            <a:pPr algn="ctr"/>
-            <a:endParaRPr lang="en-MY" dirty="0"/>
-          </a:p>
-        </p:txBody>
-      </p:sp>
-      <p:sp>
-        <p:nvSpPr>
-          <p:cNvPr id="4" name="Rectangle 3">
-            <a:extLst>
-              <a:ext uri="{FF2B5EF4-FFF2-40B4-BE49-F238E27FC236}">
-                <a16:creationId xmlns:a16="http://schemas.microsoft.com/office/drawing/2014/main" id="{57893C18-91D9-C80B-D2C7-18C6C4AE2128}"/>
-              </a:ext>
-            </a:extLst>
-          </p:cNvPr>
-          <p:cNvSpPr/>
-          <p:nvPr/>
-        </p:nvSpPr>
-        <p:spPr>
-          <a:xfrm>
-            <a:off x="615043" y="1654626"/>
-            <a:ext cx="968829" cy="620486"/>
-          </a:xfrm>
-          <a:prstGeom prst="rect">
-            <a:avLst/>
-          </a:prstGeom>
-        </p:spPr>
-        <p:style>
-          <a:lnRef idx="2">
-            <a:schemeClr val="accent6"/>
-          </a:lnRef>
-          <a:fillRef idx="1">
-            <a:schemeClr val="lt1"/>
-          </a:fillRef>
-          <a:effectRef idx="0">
-            <a:schemeClr val="accent6"/>
-          </a:effectRef>
-          <a:fontRef idx="minor">
-            <a:schemeClr val="dk1"/>
-          </a:fontRef>
-        </p:style>
-        <p:txBody>
-          <a:bodyPr rtlCol="0" anchor="ctr"/>
-          <a:lstStyle/>
-          <a:p>
-            <a:pPr algn="ctr"/>
-            <a:r>
-              <a:rPr lang="en-MY" dirty="0"/>
-              <a:t>DWS</a:t>
-            </a:r>
-          </a:p>
-        </p:txBody>
-      </p:sp>
-      <p:sp>
-        <p:nvSpPr>
-          <p:cNvPr id="5" name="Rectangle 4">
-            <a:extLst>
-              <a:ext uri="{FF2B5EF4-FFF2-40B4-BE49-F238E27FC236}">
-                <a16:creationId xmlns:a16="http://schemas.microsoft.com/office/drawing/2014/main" id="{6874E4CB-6612-5B8B-13C8-15FAE0D68821}"/>
-              </a:ext>
-            </a:extLst>
-          </p:cNvPr>
-          <p:cNvSpPr/>
-          <p:nvPr/>
-        </p:nvSpPr>
-        <p:spPr>
-          <a:xfrm>
-            <a:off x="674913" y="3124201"/>
-            <a:ext cx="968829" cy="620486"/>
-          </a:xfrm>
-          <a:prstGeom prst="rect">
-            <a:avLst/>
-          </a:prstGeom>
-        </p:spPr>
-        <p:style>
-          <a:lnRef idx="2">
-            <a:schemeClr val="accent6"/>
-          </a:lnRef>
-          <a:fillRef idx="1">
-            <a:schemeClr val="lt1"/>
-          </a:fillRef>
-          <a:effectRef idx="0">
-            <a:schemeClr val="accent6"/>
-          </a:effectRef>
-          <a:fontRef idx="minor">
-            <a:schemeClr val="dk1"/>
-          </a:fontRef>
-        </p:style>
-        <p:txBody>
-          <a:bodyPr rtlCol="0" anchor="ctr"/>
-          <a:lstStyle/>
-          <a:p>
-            <a:pPr algn="ctr"/>
-            <a:r>
-              <a:rPr lang="en-MY" dirty="0"/>
-              <a:t>CSS</a:t>
-            </a:r>
-          </a:p>
-        </p:txBody>
-      </p:sp>
-      <p:sp>
-        <p:nvSpPr>
-          <p:cNvPr id="6" name="Rectangle 5">
-            <a:extLst>
-              <a:ext uri="{FF2B5EF4-FFF2-40B4-BE49-F238E27FC236}">
-                <a16:creationId xmlns:a16="http://schemas.microsoft.com/office/drawing/2014/main" id="{2B89FB24-C0EF-8BB3-4D15-0B0F60802E66}"/>
-              </a:ext>
-            </a:extLst>
-          </p:cNvPr>
-          <p:cNvSpPr/>
-          <p:nvPr/>
-        </p:nvSpPr>
-        <p:spPr>
-          <a:xfrm>
-            <a:off x="2351315" y="1368878"/>
-            <a:ext cx="1219200" cy="1191985"/>
-          </a:xfrm>
-          <a:prstGeom prst="rect">
-            <a:avLst/>
-          </a:prstGeom>
-        </p:spPr>
-        <p:style>
-          <a:lnRef idx="2">
-            <a:schemeClr val="accent6"/>
-          </a:lnRef>
-          <a:fillRef idx="1">
-            <a:schemeClr val="lt1"/>
-          </a:fillRef>
-          <a:effectRef idx="0">
-            <a:schemeClr val="accent6"/>
-          </a:effectRef>
-          <a:fontRef idx="minor">
-            <a:schemeClr val="dk1"/>
-          </a:fontRef>
-        </p:style>
-        <p:txBody>
-          <a:bodyPr rtlCol="0" anchor="ctr"/>
-          <a:lstStyle/>
-          <a:p>
-            <a:pPr algn="ctr"/>
-            <a:r>
-              <a:rPr lang="en-MY" dirty="0"/>
-              <a:t>Drizzle ORM</a:t>
-            </a:r>
-          </a:p>
-        </p:txBody>
-      </p:sp>
-      <p:sp>
-        <p:nvSpPr>
-          <p:cNvPr id="7" name="Rectangle 6">
-            <a:extLst>
-              <a:ext uri="{FF2B5EF4-FFF2-40B4-BE49-F238E27FC236}">
-                <a16:creationId xmlns:a16="http://schemas.microsoft.com/office/drawing/2014/main" id="{E30EF2D9-2FC7-4410-0BD3-037F037C8781}"/>
-              </a:ext>
-            </a:extLst>
-          </p:cNvPr>
-          <p:cNvSpPr/>
-          <p:nvPr/>
-        </p:nvSpPr>
-        <p:spPr>
-          <a:xfrm>
-            <a:off x="4180114" y="1368878"/>
-            <a:ext cx="1219200" cy="1191985"/>
-          </a:xfrm>
-          <a:prstGeom prst="rect">
-            <a:avLst/>
-          </a:prstGeom>
-        </p:spPr>
-        <p:style>
-          <a:lnRef idx="2">
-            <a:schemeClr val="accent6"/>
-          </a:lnRef>
-          <a:fillRef idx="1">
-            <a:schemeClr val="lt1"/>
-          </a:fillRef>
-          <a:effectRef idx="0">
-            <a:schemeClr val="accent6"/>
-          </a:effectRef>
-          <a:fontRef idx="minor">
-            <a:schemeClr val="dk1"/>
-          </a:fontRef>
-        </p:style>
-        <p:txBody>
-          <a:bodyPr rtlCol="0" anchor="ctr"/>
-          <a:lstStyle/>
-          <a:p>
-            <a:pPr algn="ctr"/>
-            <a:r>
-              <a:rPr lang="en-MY" dirty="0" err="1"/>
-              <a:t>NextJS</a:t>
-            </a:r>
-            <a:endParaRPr lang="en-MY" dirty="0"/>
-          </a:p>
-        </p:txBody>
-      </p:sp>
-      <p:sp>
-        <p:nvSpPr>
-          <p:cNvPr id="8" name="Rectangle 7">
-            <a:extLst>
-              <a:ext uri="{FF2B5EF4-FFF2-40B4-BE49-F238E27FC236}">
-                <a16:creationId xmlns:a16="http://schemas.microsoft.com/office/drawing/2014/main" id="{745873D6-E7A4-E7FA-4D74-21950E6759A7}"/>
-              </a:ext>
-            </a:extLst>
-          </p:cNvPr>
-          <p:cNvSpPr/>
-          <p:nvPr/>
-        </p:nvSpPr>
-        <p:spPr>
-          <a:xfrm>
-            <a:off x="5856514" y="1368878"/>
-            <a:ext cx="1219200" cy="1191985"/>
-          </a:xfrm>
-          <a:prstGeom prst="rect">
-            <a:avLst/>
-          </a:prstGeom>
-        </p:spPr>
-        <p:style>
-          <a:lnRef idx="2">
-            <a:schemeClr val="accent6"/>
-          </a:lnRef>
-          <a:fillRef idx="1">
-            <a:schemeClr val="lt1"/>
-          </a:fillRef>
-          <a:effectRef idx="0">
-            <a:schemeClr val="accent6"/>
-          </a:effectRef>
-          <a:fontRef idx="minor">
-            <a:schemeClr val="dk1"/>
-          </a:fontRef>
-        </p:style>
-        <p:txBody>
-          <a:bodyPr rtlCol="0" anchor="ctr"/>
-          <a:lstStyle/>
-          <a:p>
-            <a:pPr algn="ctr"/>
-            <a:r>
-              <a:rPr lang="en-MY" dirty="0"/>
-              <a:t>Better Auth</a:t>
-            </a:r>
-          </a:p>
-        </p:txBody>
-      </p:sp>
-      <p:sp>
-        <p:nvSpPr>
-          <p:cNvPr id="9" name="Rectangle 8">
-            <a:extLst>
-              <a:ext uri="{FF2B5EF4-FFF2-40B4-BE49-F238E27FC236}">
-                <a16:creationId xmlns:a16="http://schemas.microsoft.com/office/drawing/2014/main" id="{8D4A5376-C72F-7EE4-AD9B-40821879C248}"/>
-              </a:ext>
-            </a:extLst>
-          </p:cNvPr>
-          <p:cNvSpPr/>
-          <p:nvPr/>
-        </p:nvSpPr>
-        <p:spPr>
-          <a:xfrm>
-            <a:off x="4180114" y="3116039"/>
-            <a:ext cx="1219200" cy="628648"/>
-          </a:xfrm>
-          <a:prstGeom prst="rect">
-            <a:avLst/>
-          </a:prstGeom>
-        </p:spPr>
-        <p:style>
-          <a:lnRef idx="2">
-            <a:schemeClr val="accent6"/>
-          </a:lnRef>
-          <a:fillRef idx="1">
-            <a:schemeClr val="lt1"/>
-          </a:fillRef>
-          <a:effectRef idx="0">
-            <a:schemeClr val="accent6"/>
-          </a:effectRef>
-          <a:fontRef idx="minor">
-            <a:schemeClr val="dk1"/>
-          </a:fontRef>
-        </p:style>
-        <p:txBody>
-          <a:bodyPr rtlCol="0" anchor="ctr"/>
-          <a:lstStyle/>
-          <a:p>
-            <a:pPr algn="ctr"/>
-            <a:r>
-              <a:rPr lang="en-MY" dirty="0"/>
-              <a:t>Azure OpenAI</a:t>
-            </a:r>
-          </a:p>
-        </p:txBody>
-      </p:sp>
-      <p:sp>
-        <p:nvSpPr>
-          <p:cNvPr id="10" name="Rectangle 9">
-            <a:extLst>
-              <a:ext uri="{FF2B5EF4-FFF2-40B4-BE49-F238E27FC236}">
-                <a16:creationId xmlns:a16="http://schemas.microsoft.com/office/drawing/2014/main" id="{9585C9F7-769C-22EC-4D8C-18E4A7067610}"/>
-              </a:ext>
-            </a:extLst>
-          </p:cNvPr>
-          <p:cNvSpPr/>
-          <p:nvPr/>
-        </p:nvSpPr>
-        <p:spPr>
-          <a:xfrm>
-            <a:off x="7641771" y="1368877"/>
-            <a:ext cx="1219200" cy="1191985"/>
-          </a:xfrm>
-          <a:prstGeom prst="rect">
-            <a:avLst/>
-          </a:prstGeom>
-        </p:spPr>
-        <p:style>
-          <a:lnRef idx="2">
-            <a:schemeClr val="accent6"/>
-          </a:lnRef>
-          <a:fillRef idx="1">
-            <a:schemeClr val="lt1"/>
-          </a:fillRef>
-          <a:effectRef idx="0">
-            <a:schemeClr val="accent6"/>
-          </a:effectRef>
-          <a:fontRef idx="minor">
-            <a:schemeClr val="dk1"/>
-          </a:fontRef>
-        </p:style>
-        <p:txBody>
-          <a:bodyPr rtlCol="0" anchor="ctr"/>
-          <a:lstStyle/>
-          <a:p>
-            <a:pPr algn="ctr"/>
-            <a:r>
-              <a:rPr lang="en-MY" dirty="0"/>
-              <a:t>IAM</a:t>
-            </a:r>
-          </a:p>
-        </p:txBody>
-      </p:sp>
-      <p:sp>
-        <p:nvSpPr>
-          <p:cNvPr id="12" name="TextBox 11">
-            <a:extLst>
-              <a:ext uri="{FF2B5EF4-FFF2-40B4-BE49-F238E27FC236}">
-                <a16:creationId xmlns:a16="http://schemas.microsoft.com/office/drawing/2014/main" id="{B4D239F5-8B82-D85C-DEB1-494248FF4369}"/>
-              </a:ext>
-            </a:extLst>
-          </p:cNvPr>
-          <p:cNvSpPr txBox="1"/>
-          <p:nvPr/>
-        </p:nvSpPr>
-        <p:spPr>
-          <a:xfrm>
-            <a:off x="2623321" y="999545"/>
-            <a:ext cx="675185" cy="369332"/>
-          </a:xfrm>
-          <a:prstGeom prst="rect">
-            <a:avLst/>
-          </a:prstGeom>
-          <a:noFill/>
-        </p:spPr>
-        <p:txBody>
-          <a:bodyPr wrap="none" rtlCol="0">
-            <a:spAutoFit/>
-          </a:bodyPr>
-          <a:lstStyle/>
-          <a:p>
-            <a:r>
-              <a:rPr lang="en-MY" dirty="0"/>
-              <a:t>ORM</a:t>
-            </a:r>
-          </a:p>
-        </p:txBody>
-      </p:sp>
-      <p:sp>
-        <p:nvSpPr>
-          <p:cNvPr id="13" name="TextBox 12">
-            <a:extLst>
-              <a:ext uri="{FF2B5EF4-FFF2-40B4-BE49-F238E27FC236}">
-                <a16:creationId xmlns:a16="http://schemas.microsoft.com/office/drawing/2014/main" id="{F3DDF08E-9595-30F7-4EBD-B5DBC9171653}"/>
-              </a:ext>
-            </a:extLst>
-          </p:cNvPr>
-          <p:cNvSpPr txBox="1"/>
-          <p:nvPr/>
-        </p:nvSpPr>
-        <p:spPr>
-          <a:xfrm>
-            <a:off x="4452121" y="925677"/>
-            <a:ext cx="580608" cy="369332"/>
-          </a:xfrm>
-          <a:prstGeom prst="rect">
-            <a:avLst/>
-          </a:prstGeom>
-          <a:noFill/>
-        </p:spPr>
-        <p:txBody>
-          <a:bodyPr wrap="none" rtlCol="0">
-            <a:spAutoFit/>
-          </a:bodyPr>
-          <a:lstStyle/>
-          <a:p>
-            <a:r>
-              <a:rPr lang="en-MY" dirty="0"/>
-              <a:t>App</a:t>
-            </a:r>
-          </a:p>
-        </p:txBody>
-      </p:sp>
-      <p:sp>
-        <p:nvSpPr>
-          <p:cNvPr id="14" name="TextBox 13">
-            <a:extLst>
-              <a:ext uri="{FF2B5EF4-FFF2-40B4-BE49-F238E27FC236}">
-                <a16:creationId xmlns:a16="http://schemas.microsoft.com/office/drawing/2014/main" id="{BE7EF78E-92D1-3E41-D53E-145023C79038}"/>
-              </a:ext>
-            </a:extLst>
-          </p:cNvPr>
-          <p:cNvSpPr txBox="1"/>
-          <p:nvPr/>
-        </p:nvSpPr>
-        <p:spPr>
-          <a:xfrm>
-            <a:off x="5638900" y="925677"/>
-            <a:ext cx="1513556" cy="369332"/>
-          </a:xfrm>
-          <a:prstGeom prst="rect">
-            <a:avLst/>
-          </a:prstGeom>
-          <a:noFill/>
-        </p:spPr>
-        <p:txBody>
-          <a:bodyPr wrap="none" rtlCol="0">
-            <a:spAutoFit/>
-          </a:bodyPr>
-          <a:lstStyle/>
-          <a:p>
-            <a:r>
-              <a:rPr lang="en-MY" dirty="0"/>
-              <a:t>Authorization</a:t>
-            </a:r>
-          </a:p>
-        </p:txBody>
-      </p:sp>
-      <p:sp>
-        <p:nvSpPr>
-          <p:cNvPr id="15" name="TextBox 14">
-            <a:extLst>
-              <a:ext uri="{FF2B5EF4-FFF2-40B4-BE49-F238E27FC236}">
-                <a16:creationId xmlns:a16="http://schemas.microsoft.com/office/drawing/2014/main" id="{E4A9CD5D-CFDB-D200-54E7-E9C983388AA5}"/>
-              </a:ext>
-            </a:extLst>
-          </p:cNvPr>
-          <p:cNvSpPr txBox="1"/>
-          <p:nvPr/>
-        </p:nvSpPr>
-        <p:spPr>
-          <a:xfrm>
-            <a:off x="7424157" y="902544"/>
-            <a:ext cx="1654427" cy="369332"/>
-          </a:xfrm>
-          <a:prstGeom prst="rect">
-            <a:avLst/>
-          </a:prstGeom>
-          <a:noFill/>
-        </p:spPr>
-        <p:txBody>
-          <a:bodyPr wrap="none" rtlCol="0">
-            <a:spAutoFit/>
-          </a:bodyPr>
-          <a:lstStyle/>
-          <a:p>
-            <a:r>
-              <a:rPr lang="en-MY" dirty="0"/>
-              <a:t>Authentication</a:t>
-            </a:r>
-          </a:p>
-        </p:txBody>
-      </p:sp>
-      <p:sp>
-        <p:nvSpPr>
-          <p:cNvPr id="16" name="TextBox 15">
-            <a:extLst>
-              <a:ext uri="{FF2B5EF4-FFF2-40B4-BE49-F238E27FC236}">
-                <a16:creationId xmlns:a16="http://schemas.microsoft.com/office/drawing/2014/main" id="{3D5D6B0C-5A5B-DDA4-10A2-52780622033F}"/>
-              </a:ext>
-            </a:extLst>
-          </p:cNvPr>
-          <p:cNvSpPr txBox="1"/>
-          <p:nvPr/>
-        </p:nvSpPr>
-        <p:spPr>
-          <a:xfrm>
-            <a:off x="4443304" y="3791348"/>
-            <a:ext cx="598241" cy="369332"/>
-          </a:xfrm>
-          <a:prstGeom prst="rect">
-            <a:avLst/>
-          </a:prstGeom>
-          <a:noFill/>
-        </p:spPr>
-        <p:txBody>
-          <a:bodyPr wrap="none" rtlCol="0">
-            <a:spAutoFit/>
-          </a:bodyPr>
-          <a:lstStyle/>
-          <a:p>
-            <a:r>
-              <a:rPr lang="en-MY" dirty="0"/>
-              <a:t>LLM</a:t>
-            </a:r>
-          </a:p>
-        </p:txBody>
-      </p:sp>
-      <p:cxnSp>
-        <p:nvCxnSpPr>
-          <p:cNvPr id="20" name="Straight Arrow Connector 19">
-            <a:extLst>
-              <a:ext uri="{FF2B5EF4-FFF2-40B4-BE49-F238E27FC236}">
-                <a16:creationId xmlns:a16="http://schemas.microsoft.com/office/drawing/2014/main" id="{57C99799-9C00-4441-D975-6D49BCF190CC}"/>
-              </a:ext>
-            </a:extLst>
-          </p:cNvPr>
-          <p:cNvCxnSpPr>
-            <a:stCxn id="4" idx="3"/>
-            <a:endCxn id="6" idx="1"/>
-          </p:cNvCxnSpPr>
-          <p:nvPr/>
-        </p:nvCxnSpPr>
-        <p:spPr>
-          <a:xfrm>
-            <a:off x="1583872" y="1964869"/>
-            <a:ext cx="767443" cy="2"/>
-          </a:xfrm>
-          <a:prstGeom prst="straightConnector1">
-            <a:avLst/>
-          </a:prstGeom>
-          <a:ln>
-            <a:tailEnd type="triangle"/>
-          </a:ln>
-        </p:spPr>
-        <p:style>
-          <a:lnRef idx="2">
-            <a:schemeClr val="dk1"/>
-          </a:lnRef>
-          <a:fillRef idx="0">
-            <a:schemeClr val="dk1"/>
-          </a:fillRef>
-          <a:effectRef idx="1">
-            <a:schemeClr val="dk1"/>
-          </a:effectRef>
-          <a:fontRef idx="minor">
-            <a:schemeClr val="tx1"/>
-          </a:fontRef>
-        </p:style>
-      </p:cxnSp>
-      <p:cxnSp>
-        <p:nvCxnSpPr>
-          <p:cNvPr id="21" name="Straight Arrow Connector 20">
-            <a:extLst>
-              <a:ext uri="{FF2B5EF4-FFF2-40B4-BE49-F238E27FC236}">
-                <a16:creationId xmlns:a16="http://schemas.microsoft.com/office/drawing/2014/main" id="{90E48BA8-8C11-863C-C1C2-A7575992E9E6}"/>
-              </a:ext>
-            </a:extLst>
-          </p:cNvPr>
-          <p:cNvCxnSpPr>
-            <a:cxnSpLocks/>
-            <a:endCxn id="9" idx="1"/>
-          </p:cNvCxnSpPr>
-          <p:nvPr/>
-        </p:nvCxnSpPr>
-        <p:spPr>
-          <a:xfrm>
-            <a:off x="1619249" y="3429000"/>
-            <a:ext cx="2560865" cy="1363"/>
-          </a:xfrm>
-          <a:prstGeom prst="straightConnector1">
-            <a:avLst/>
-          </a:prstGeom>
-          <a:ln>
-            <a:tailEnd type="triangle"/>
-          </a:ln>
-        </p:spPr>
-        <p:style>
-          <a:lnRef idx="2">
-            <a:schemeClr val="dk1"/>
-          </a:lnRef>
-          <a:fillRef idx="0">
-            <a:schemeClr val="dk1"/>
-          </a:fillRef>
-          <a:effectRef idx="1">
-            <a:schemeClr val="dk1"/>
-          </a:effectRef>
-          <a:fontRef idx="minor">
-            <a:schemeClr val="tx1"/>
-          </a:fontRef>
-        </p:style>
-      </p:cxnSp>
-      <p:sp>
-        <p:nvSpPr>
-          <p:cNvPr id="22" name="TextBox 21">
-            <a:extLst>
-              <a:ext uri="{FF2B5EF4-FFF2-40B4-BE49-F238E27FC236}">
-                <a16:creationId xmlns:a16="http://schemas.microsoft.com/office/drawing/2014/main" id="{4CE80047-8DE4-0161-3C04-2ED94947EAA9}"/>
-              </a:ext>
-            </a:extLst>
-          </p:cNvPr>
-          <p:cNvSpPr txBox="1"/>
-          <p:nvPr/>
-        </p:nvSpPr>
-        <p:spPr>
-          <a:xfrm>
-            <a:off x="8860971" y="436211"/>
-            <a:ext cx="632353" cy="369332"/>
-          </a:xfrm>
-          <a:prstGeom prst="rect">
-            <a:avLst/>
-          </a:prstGeom>
-          <a:noFill/>
-        </p:spPr>
-        <p:txBody>
-          <a:bodyPr wrap="none" rtlCol="0">
-            <a:spAutoFit/>
-          </a:bodyPr>
-          <a:lstStyle/>
-          <a:p>
-            <a:r>
-              <a:rPr lang="en-MY" dirty="0"/>
-              <a:t>CCE</a:t>
-            </a:r>
-          </a:p>
-        </p:txBody>
-      </p:sp>
-      <p:cxnSp>
-        <p:nvCxnSpPr>
-          <p:cNvPr id="24" name="Straight Arrow Connector 23">
-            <a:extLst>
-              <a:ext uri="{FF2B5EF4-FFF2-40B4-BE49-F238E27FC236}">
-                <a16:creationId xmlns:a16="http://schemas.microsoft.com/office/drawing/2014/main" id="{BCFD8DA5-3601-4598-3BC4-CD2A6CDFF2FC}"/>
-              </a:ext>
-            </a:extLst>
-          </p:cNvPr>
-          <p:cNvCxnSpPr>
-            <a:cxnSpLocks/>
-            <a:stCxn id="9" idx="0"/>
-          </p:cNvCxnSpPr>
-          <p:nvPr/>
-        </p:nvCxnSpPr>
-        <p:spPr>
-          <a:xfrm flipV="1">
-            <a:off x="4789714" y="2560862"/>
-            <a:ext cx="0" cy="555177"/>
-          </a:xfrm>
-          <a:prstGeom prst="straightConnector1">
-            <a:avLst/>
-          </a:prstGeom>
-          <a:ln>
-            <a:tailEnd type="triangle"/>
-          </a:ln>
-        </p:spPr>
-        <p:style>
-          <a:lnRef idx="2">
-            <a:schemeClr val="dk1"/>
-          </a:lnRef>
-          <a:fillRef idx="0">
-            <a:schemeClr val="dk1"/>
-          </a:fillRef>
-          <a:effectRef idx="1">
-            <a:schemeClr val="dk1"/>
-          </a:effectRef>
-          <a:fontRef idx="minor">
-            <a:schemeClr val="tx1"/>
-          </a:fontRef>
-        </p:style>
-      </p:cxnSp>
-      <p:sp>
-        <p:nvSpPr>
-          <p:cNvPr id="27" name="TextBox 26">
-            <a:extLst>
-              <a:ext uri="{FF2B5EF4-FFF2-40B4-BE49-F238E27FC236}">
-                <a16:creationId xmlns:a16="http://schemas.microsoft.com/office/drawing/2014/main" id="{80AAE55C-03CD-79DB-67AC-1DC3D91742DF}"/>
-              </a:ext>
-            </a:extLst>
-          </p:cNvPr>
-          <p:cNvSpPr txBox="1"/>
-          <p:nvPr/>
-        </p:nvSpPr>
-        <p:spPr>
-          <a:xfrm>
-            <a:off x="9601300" y="1595537"/>
-            <a:ext cx="652486" cy="369332"/>
-          </a:xfrm>
-          <a:prstGeom prst="rect">
-            <a:avLst/>
-          </a:prstGeom>
-          <a:noFill/>
-        </p:spPr>
-        <p:txBody>
-          <a:bodyPr wrap="none" rtlCol="0">
-            <a:spAutoFit/>
-          </a:bodyPr>
-          <a:lstStyle/>
-          <a:p>
-            <a:r>
-              <a:rPr lang="en-MY" dirty="0"/>
-              <a:t>User</a:t>
-            </a:r>
-          </a:p>
-        </p:txBody>
-      </p:sp>
-      <p:sp>
-        <p:nvSpPr>
-          <p:cNvPr id="28" name="Rectangle 27">
-            <a:extLst>
-              <a:ext uri="{FF2B5EF4-FFF2-40B4-BE49-F238E27FC236}">
-                <a16:creationId xmlns:a16="http://schemas.microsoft.com/office/drawing/2014/main" id="{EFBEA0D4-69DB-15E0-A792-A7993727FC45}"/>
-              </a:ext>
-            </a:extLst>
-          </p:cNvPr>
-          <p:cNvSpPr/>
-          <p:nvPr/>
-        </p:nvSpPr>
-        <p:spPr>
-          <a:xfrm>
-            <a:off x="5856513" y="3004846"/>
-            <a:ext cx="1219200" cy="786502"/>
-          </a:xfrm>
-          <a:prstGeom prst="rect">
-            <a:avLst/>
-          </a:prstGeom>
-        </p:spPr>
-        <p:style>
-          <a:lnRef idx="2">
-            <a:schemeClr val="accent6"/>
-          </a:lnRef>
-          <a:fillRef idx="1">
-            <a:schemeClr val="lt1"/>
-          </a:fillRef>
-          <a:effectRef idx="0">
-            <a:schemeClr val="accent6"/>
-          </a:effectRef>
-          <a:fontRef idx="minor">
-            <a:schemeClr val="dk1"/>
-          </a:fontRef>
-        </p:style>
-        <p:txBody>
-          <a:bodyPr rtlCol="0" anchor="ctr"/>
-          <a:lstStyle/>
-          <a:p>
-            <a:pPr algn="ctr"/>
-            <a:r>
-              <a:rPr lang="en-MY" dirty="0"/>
-              <a:t>Self-Hosted</a:t>
-            </a:r>
-          </a:p>
-          <a:p>
-            <a:pPr algn="ctr"/>
-            <a:r>
-              <a:rPr lang="en-MY" dirty="0"/>
-              <a:t>LLM</a:t>
-            </a:r>
-          </a:p>
-        </p:txBody>
-      </p:sp>
-      <p:sp>
-        <p:nvSpPr>
-          <p:cNvPr id="29" name="TextBox 28">
-            <a:extLst>
-              <a:ext uri="{FF2B5EF4-FFF2-40B4-BE49-F238E27FC236}">
-                <a16:creationId xmlns:a16="http://schemas.microsoft.com/office/drawing/2014/main" id="{D4514361-4D7D-0977-17DE-691CEA5F731A}"/>
-              </a:ext>
-            </a:extLst>
-          </p:cNvPr>
-          <p:cNvSpPr txBox="1"/>
-          <p:nvPr/>
-        </p:nvSpPr>
-        <p:spPr>
-          <a:xfrm>
-            <a:off x="6166992" y="3791348"/>
-            <a:ext cx="638316" cy="369332"/>
-          </a:xfrm>
-          <a:prstGeom prst="rect">
-            <a:avLst/>
-          </a:prstGeom>
-          <a:noFill/>
-        </p:spPr>
-        <p:txBody>
-          <a:bodyPr wrap="none" rtlCol="0">
-            <a:spAutoFit/>
-          </a:bodyPr>
-          <a:lstStyle/>
-          <a:p>
-            <a:r>
-              <a:rPr lang="en-MY" dirty="0"/>
-              <a:t>GPU</a:t>
-            </a:r>
-          </a:p>
-        </p:txBody>
-      </p:sp>
-      <p:cxnSp>
-        <p:nvCxnSpPr>
-          <p:cNvPr id="31" name="Straight Connector 30">
-            <a:extLst>
-              <a:ext uri="{FF2B5EF4-FFF2-40B4-BE49-F238E27FC236}">
-                <a16:creationId xmlns:a16="http://schemas.microsoft.com/office/drawing/2014/main" id="{3376FA9A-1033-6CBD-C48F-6E7A227CE573}"/>
-              </a:ext>
-            </a:extLst>
-          </p:cNvPr>
-          <p:cNvCxnSpPr>
-            <a:cxnSpLocks/>
-          </p:cNvCxnSpPr>
-          <p:nvPr/>
-        </p:nvCxnSpPr>
-        <p:spPr>
-          <a:xfrm>
-            <a:off x="5456463" y="3201761"/>
-            <a:ext cx="342900" cy="542926"/>
-          </a:xfrm>
-          <a:prstGeom prst="line">
-            <a:avLst/>
-          </a:prstGeom>
-        </p:spPr>
-        <p:style>
-          <a:lnRef idx="2">
-            <a:schemeClr val="dk1"/>
-          </a:lnRef>
-          <a:fillRef idx="0">
-            <a:schemeClr val="dk1"/>
-          </a:fillRef>
-          <a:effectRef idx="1">
-            <a:schemeClr val="dk1"/>
-          </a:effectRef>
-          <a:fontRef idx="minor">
-            <a:schemeClr val="tx1"/>
-          </a:fontRef>
-        </p:style>
-      </p:cxnSp>
-    </p:spTree>
-    <p:extLst>
-      <p:ext uri="{BB962C8B-B14F-4D97-AF65-F5344CB8AC3E}">
-        <p14:creationId xmlns:p14="http://schemas.microsoft.com/office/powerpoint/2010/main" val="847988480"/>
       </p:ext>
     </p:extLst>
   </p:cSld>

</xml_diff>